<commit_message>
Adding HP optimization and structural changes
</commit_message>
<xml_diff>
--- a/TM_TP0G1_Zanelli_Spena_Sandoval_Biga.pptx
+++ b/TM_TP0G1_Zanelli_Spena_Sandoval_Biga.pptx
@@ -5,7 +5,7 @@
     <p:sldMasterId id="2147483648" r:id="rId1"/>
   </p:sldMasterIdLst>
   <p:notesMasterIdLst>
-    <p:notesMasterId r:id="rId15"/>
+    <p:notesMasterId r:id="rId13"/>
   </p:notesMasterIdLst>
   <p:sldIdLst>
     <p:sldId id="256" r:id="rId2"/>
@@ -19,8 +19,6 @@
     <p:sldId id="264" r:id="rId10"/>
     <p:sldId id="265" r:id="rId11"/>
     <p:sldId id="266" r:id="rId12"/>
-    <p:sldId id="267" r:id="rId13"/>
-    <p:sldId id="268" r:id="rId14"/>
   </p:sldIdLst>
   <p:sldSz cx="12192000" cy="6858000"/>
   <p:notesSz cx="6858000" cy="9144000"/>
@@ -254,8 +252,11 @@
     </a:lvl9pPr>
   </p:defaultTextStyle>
   <p:extLst>
+    <p:ext uri="{EFAFB233-063F-42B5-8137-9DF3F51BA10A}">
+      <p15:sldGuideLst xmlns:p15="http://schemas.microsoft.com/office/powerpoint/2012/main"/>
+    </p:ext>
     <p:ext uri="http://customooxmlschemas.google.com/">
-      <go:slidesCustomData xmlns:go="http://customooxmlschemas.google.com/" xmlns:ahyp="http://schemas.microsoft.com/office/drawing/2018/hyperlinkcolor" xmlns:p15="http://schemas.microsoft.com/office/powerpoint/2012/main" xmlns:p14="http://schemas.microsoft.com/office/powerpoint/2010/main" xmlns:com="http://schemas.openxmlformats.org/drawingml/2006/compatibility" xmlns:pvml="urn:schemas-microsoft-com:office:powerpoint" xmlns:v="urn:schemas-microsoft-com:vml" xmlns:o="urn:schemas-microsoft-com:office:office" xmlns:dgm="http://schemas.openxmlformats.org/drawingml/2006/diagram" xmlns:c="http://schemas.openxmlformats.org/drawingml/2006/chart" xmlns:mv="urn:schemas-microsoft-com:mac:vml" xmlns:mc="http://schemas.openxmlformats.org/markup-compatibility/2006" xmlns="" r:id="rId18" roundtripDataSignature="AMtx7miN8pLDEjDbm7/1vcBnEucCBoIuuw=="/>
+      <go:slidesCustomData xmlns="" xmlns:mc="http://schemas.openxmlformats.org/markup-compatibility/2006" xmlns:mv="urn:schemas-microsoft-com:mac:vml" xmlns:c="http://schemas.openxmlformats.org/drawingml/2006/chart" xmlns:dgm="http://schemas.openxmlformats.org/drawingml/2006/diagram" xmlns:o="urn:schemas-microsoft-com:office:office" xmlns:v="urn:schemas-microsoft-com:vml" xmlns:pvml="urn:schemas-microsoft-com:office:powerpoint" xmlns:com="http://schemas.openxmlformats.org/drawingml/2006/compatibility" xmlns:p14="http://schemas.microsoft.com/office/powerpoint/2010/main" xmlns:p15="http://schemas.microsoft.com/office/powerpoint/2012/main" xmlns:ahyp="http://schemas.microsoft.com/office/drawing/2018/hyperlinkcolor" xmlns:go="http://customooxmlschemas.google.com/" r:id="rId18" roundtripDataSignature="AMtx7miN8pLDEjDbm7/1vcBnEucCBoIuuw=="/>
     </p:ext>
   </p:extLst>
 </p:presentation>
@@ -1720,214 +1721,6 @@
       <p:sp>
         <p:nvSpPr>
           <p:cNvPr id="201" name="Google Shape;201;p11:notes"/>
-          <p:cNvSpPr>
-            <a:spLocks noGrp="1" noRot="1" noChangeAspect="1"/>
-          </p:cNvSpPr>
-          <p:nvPr>
-            <p:ph type="sldImg" idx="2"/>
-          </p:nvPr>
-        </p:nvSpPr>
-        <p:spPr>
-          <a:xfrm>
-            <a:off x="685800" y="1143000"/>
-            <a:ext cx="5486400" cy="3086100"/>
-          </a:xfrm>
-          <a:custGeom>
-            <a:avLst/>
-            <a:gdLst/>
-            <a:ahLst/>
-            <a:cxnLst/>
-            <a:rect l="l" t="t" r="r" b="b"/>
-            <a:pathLst>
-              <a:path w="120000" h="120000" extrusionOk="0">
-                <a:moveTo>
-                  <a:pt x="0" y="0"/>
-                </a:moveTo>
-                <a:lnTo>
-                  <a:pt x="120000" y="0"/>
-                </a:lnTo>
-                <a:lnTo>
-                  <a:pt x="120000" y="120000"/>
-                </a:lnTo>
-                <a:lnTo>
-                  <a:pt x="0" y="120000"/>
-                </a:lnTo>
-                <a:close/>
-              </a:path>
-            </a:pathLst>
-          </a:custGeom>
-        </p:spPr>
-      </p:sp>
-    </p:spTree>
-  </p:cSld>
-  <p:clrMapOvr>
-    <a:masterClrMapping/>
-  </p:clrMapOvr>
-</p:notes>
-</file>
-
-<file path=ppt/notesSlides/notesSlide12.xml><?xml version="1.0" encoding="utf-8"?>
-<p:notes xmlns:a="http://schemas.openxmlformats.org/drawingml/2006/main" xmlns:r="http://schemas.openxmlformats.org/officeDocument/2006/relationships" xmlns:p="http://schemas.openxmlformats.org/presentationml/2006/main" showMasterSp="0" showMasterPhAnim="0">
-  <p:cSld>
-    <p:spTree>
-      <p:nvGrpSpPr>
-        <p:cNvPr id="1" name="Shape 207"/>
-        <p:cNvGrpSpPr/>
-        <p:nvPr/>
-      </p:nvGrpSpPr>
-      <p:grpSpPr>
-        <a:xfrm>
-          <a:off x="0" y="0"/>
-          <a:ext cx="0" cy="0"/>
-          <a:chOff x="0" y="0"/>
-          <a:chExt cx="0" cy="0"/>
-        </a:xfrm>
-      </p:grpSpPr>
-      <p:sp>
-        <p:nvSpPr>
-          <p:cNvPr id="208" name="Google Shape;208;p12:notes"/>
-          <p:cNvSpPr txBox="1">
-            <a:spLocks noGrp="1"/>
-          </p:cNvSpPr>
-          <p:nvPr>
-            <p:ph type="body" idx="1"/>
-          </p:nvPr>
-        </p:nvSpPr>
-        <p:spPr>
-          <a:xfrm>
-            <a:off x="685800" y="4400550"/>
-            <a:ext cx="5486400" cy="3600450"/>
-          </a:xfrm>
-          <a:prstGeom prst="rect">
-            <a:avLst/>
-          </a:prstGeom>
-        </p:spPr>
-        <p:txBody>
-          <a:bodyPr spcFirstLastPara="1" wrap="square" lIns="91425" tIns="45700" rIns="91425" bIns="45700" anchor="t" anchorCtr="0">
-            <a:noAutofit/>
-          </a:bodyPr>
-          <a:lstStyle/>
-          <a:p>
-            <a:pPr marL="0" lvl="0" indent="0" algn="l" rtl="0">
-              <a:spcBef>
-                <a:spcPts val="0"/>
-              </a:spcBef>
-              <a:spcAft>
-                <a:spcPts val="0"/>
-              </a:spcAft>
-              <a:buNone/>
-            </a:pPr>
-            <a:endParaRPr/>
-          </a:p>
-        </p:txBody>
-      </p:sp>
-      <p:sp>
-        <p:nvSpPr>
-          <p:cNvPr id="209" name="Google Shape;209;p12:notes"/>
-          <p:cNvSpPr>
-            <a:spLocks noGrp="1" noRot="1" noChangeAspect="1"/>
-          </p:cNvSpPr>
-          <p:nvPr>
-            <p:ph type="sldImg" idx="2"/>
-          </p:nvPr>
-        </p:nvSpPr>
-        <p:spPr>
-          <a:xfrm>
-            <a:off x="685800" y="1143000"/>
-            <a:ext cx="5486400" cy="3086100"/>
-          </a:xfrm>
-          <a:custGeom>
-            <a:avLst/>
-            <a:gdLst/>
-            <a:ahLst/>
-            <a:cxnLst/>
-            <a:rect l="l" t="t" r="r" b="b"/>
-            <a:pathLst>
-              <a:path w="120000" h="120000" extrusionOk="0">
-                <a:moveTo>
-                  <a:pt x="0" y="0"/>
-                </a:moveTo>
-                <a:lnTo>
-                  <a:pt x="120000" y="0"/>
-                </a:lnTo>
-                <a:lnTo>
-                  <a:pt x="120000" y="120000"/>
-                </a:lnTo>
-                <a:lnTo>
-                  <a:pt x="0" y="120000"/>
-                </a:lnTo>
-                <a:close/>
-              </a:path>
-            </a:pathLst>
-          </a:custGeom>
-        </p:spPr>
-      </p:sp>
-    </p:spTree>
-  </p:cSld>
-  <p:clrMapOvr>
-    <a:masterClrMapping/>
-  </p:clrMapOvr>
-</p:notes>
-</file>
-
-<file path=ppt/notesSlides/notesSlide13.xml><?xml version="1.0" encoding="utf-8"?>
-<p:notes xmlns:a="http://schemas.openxmlformats.org/drawingml/2006/main" xmlns:r="http://schemas.openxmlformats.org/officeDocument/2006/relationships" xmlns:p="http://schemas.openxmlformats.org/presentationml/2006/main" showMasterSp="0" showMasterPhAnim="0">
-  <p:cSld>
-    <p:spTree>
-      <p:nvGrpSpPr>
-        <p:cNvPr id="1" name="Shape 212"/>
-        <p:cNvGrpSpPr/>
-        <p:nvPr/>
-      </p:nvGrpSpPr>
-      <p:grpSpPr>
-        <a:xfrm>
-          <a:off x="0" y="0"/>
-          <a:ext cx="0" cy="0"/>
-          <a:chOff x="0" y="0"/>
-          <a:chExt cx="0" cy="0"/>
-        </a:xfrm>
-      </p:grpSpPr>
-      <p:sp>
-        <p:nvSpPr>
-          <p:cNvPr id="213" name="Google Shape;213;p13:notes"/>
-          <p:cNvSpPr txBox="1">
-            <a:spLocks noGrp="1"/>
-          </p:cNvSpPr>
-          <p:nvPr>
-            <p:ph type="body" idx="1"/>
-          </p:nvPr>
-        </p:nvSpPr>
-        <p:spPr>
-          <a:xfrm>
-            <a:off x="685800" y="4400550"/>
-            <a:ext cx="5486400" cy="3600450"/>
-          </a:xfrm>
-          <a:prstGeom prst="rect">
-            <a:avLst/>
-          </a:prstGeom>
-        </p:spPr>
-        <p:txBody>
-          <a:bodyPr spcFirstLastPara="1" wrap="square" lIns="91425" tIns="45700" rIns="91425" bIns="45700" anchor="t" anchorCtr="0">
-            <a:noAutofit/>
-          </a:bodyPr>
-          <a:lstStyle/>
-          <a:p>
-            <a:pPr marL="0" lvl="0" indent="0" algn="l" rtl="0">
-              <a:spcBef>
-                <a:spcPts val="0"/>
-              </a:spcBef>
-              <a:spcAft>
-                <a:spcPts val="0"/>
-              </a:spcAft>
-              <a:buNone/>
-            </a:pPr>
-            <a:endParaRPr/>
-          </a:p>
-        </p:txBody>
-      </p:sp>
-      <p:sp>
-        <p:nvSpPr>
-          <p:cNvPr id="214" name="Google Shape;214;p13:notes"/>
           <p:cNvSpPr>
             <a:spLocks noGrp="1" noRot="1" noChangeAspect="1"/>
           </p:cNvSpPr>
@@ -13710,7 +13503,7 @@
               <a:buNone/>
             </a:pPr>
             <a:r>
-              <a:rPr lang="en-US" sz="1800" b="1" i="1" u="sng" strike="noStrike" cap="none">
+              <a:rPr lang="es-AR" sz="1800" b="1" i="1" u="sng" strike="noStrike" cap="none" dirty="0" err="1">
                 <a:solidFill>
                   <a:schemeClr val="dk1"/>
                 </a:solidFill>
@@ -13719,9 +13512,21 @@
                 <a:cs typeface="Arial"/>
                 <a:sym typeface="Arial"/>
               </a:rPr>
-              <a:t>GRUPO 1</a:t>
+              <a:t>Group</a:t>
             </a:r>
-            <a:endParaRPr sz="1800" b="0" i="0" u="none" strike="noStrike" cap="none">
+            <a:r>
+              <a:rPr lang="es-AR" sz="1800" b="1" i="1" u="sng" strike="noStrike" cap="none" dirty="0">
+                <a:solidFill>
+                  <a:schemeClr val="dk1"/>
+                </a:solidFill>
+                <a:latin typeface="Arial"/>
+                <a:ea typeface="Arial"/>
+                <a:cs typeface="Arial"/>
+                <a:sym typeface="Arial"/>
+              </a:rPr>
+              <a:t> 1</a:t>
+            </a:r>
+            <a:endParaRPr sz="1800" b="0" i="0" u="none" strike="noStrike" cap="none" dirty="0">
               <a:solidFill>
                 <a:schemeClr val="dk1"/>
               </a:solidFill>
@@ -13742,7 +13547,7 @@
               <a:buNone/>
             </a:pPr>
             <a:r>
-              <a:rPr lang="en-US" sz="1800" b="0" i="0" u="none" strike="noStrike" cap="none">
+              <a:rPr lang="en-US" sz="1800" b="0" i="0" u="none" strike="noStrike" cap="none" dirty="0">
                 <a:solidFill>
                   <a:schemeClr val="dk1"/>
                 </a:solidFill>
@@ -13753,7 +13558,7 @@
               </a:rPr>
               <a:t>Biga, Maximiliano</a:t>
             </a:r>
-            <a:endParaRPr sz="1800" b="0" i="0" u="none" strike="noStrike" cap="none">
+            <a:endParaRPr sz="1800" b="0" i="0" u="none" strike="noStrike" cap="none" dirty="0">
               <a:solidFill>
                 <a:schemeClr val="dk1"/>
               </a:solidFill>
@@ -13774,7 +13579,7 @@
               <a:buNone/>
             </a:pPr>
             <a:r>
-              <a:rPr lang="en-US" sz="1800" b="0" i="0" u="none" strike="noStrike" cap="none">
+              <a:rPr lang="en-US" sz="1800" b="0" i="0" u="none" strike="noStrike" cap="none" dirty="0">
                 <a:solidFill>
                   <a:schemeClr val="dk1"/>
                 </a:solidFill>
@@ -13785,7 +13590,7 @@
               </a:rPr>
               <a:t>Sandoval, John</a:t>
             </a:r>
-            <a:endParaRPr sz="1800" b="0" i="0" u="none" strike="noStrike" cap="none">
+            <a:endParaRPr sz="1800" b="0" i="0" u="none" strike="noStrike" cap="none" dirty="0">
               <a:solidFill>
                 <a:schemeClr val="dk1"/>
               </a:solidFill>
@@ -13806,7 +13611,7 @@
               <a:buNone/>
             </a:pPr>
             <a:r>
-              <a:rPr lang="en-US" sz="1800" b="0" i="0" u="none" strike="noStrike" cap="none">
+              <a:rPr lang="en-US" sz="1800" b="0" i="0" u="none" strike="noStrike" cap="none" dirty="0" err="1">
                 <a:solidFill>
                   <a:schemeClr val="dk1"/>
                 </a:solidFill>
@@ -13815,9 +13620,21 @@
                 <a:cs typeface="Arial"/>
                 <a:sym typeface="Arial"/>
               </a:rPr>
-              <a:t>Spena, Sebastian</a:t>
+              <a:t>Spena</a:t>
             </a:r>
-            <a:endParaRPr sz="1800" b="0" i="0" u="none" strike="noStrike" cap="none">
+            <a:r>
+              <a:rPr lang="en-US" sz="1800" b="0" i="0" u="none" strike="noStrike" cap="none" dirty="0">
+                <a:solidFill>
+                  <a:schemeClr val="dk1"/>
+                </a:solidFill>
+                <a:latin typeface="Arial"/>
+                <a:ea typeface="Arial"/>
+                <a:cs typeface="Arial"/>
+                <a:sym typeface="Arial"/>
+              </a:rPr>
+              <a:t>, Sebastian</a:t>
+            </a:r>
+            <a:endParaRPr sz="1800" b="0" i="0" u="none" strike="noStrike" cap="none" dirty="0">
               <a:solidFill>
                 <a:schemeClr val="dk1"/>
               </a:solidFill>
@@ -13838,7 +13655,7 @@
               <a:buNone/>
             </a:pPr>
             <a:r>
-              <a:rPr lang="en-US" sz="1800" b="0" i="0" u="none" strike="noStrike" cap="none">
+              <a:rPr lang="en-US" sz="1800" b="0" i="0" u="none" strike="noStrike" cap="none" dirty="0">
                 <a:solidFill>
                   <a:schemeClr val="dk1"/>
                 </a:solidFill>
@@ -13849,7 +13666,7 @@
               </a:rPr>
               <a:t>Zanelli, Ignacio</a:t>
             </a:r>
-            <a:endParaRPr sz="1800" b="0" i="0" u="none" strike="noStrike" cap="none">
+            <a:endParaRPr sz="1800" b="0" i="0" u="none" strike="noStrike" cap="none" dirty="0">
               <a:solidFill>
                 <a:schemeClr val="dk1"/>
               </a:solidFill>
@@ -13896,7 +13713,7 @@
               <a:buNone/>
             </a:pPr>
             <a:r>
-              <a:rPr lang="en-US" sz="6000" b="0" i="0" u="none" strike="noStrike" cap="none">
+              <a:rPr lang="en-US" sz="6000" b="0" i="0" u="none" strike="noStrike" cap="none" dirty="0" err="1">
                 <a:solidFill>
                   <a:schemeClr val="dk1"/>
                 </a:solidFill>
@@ -13905,22 +13722,10 @@
                 <a:cs typeface="Aharoni"/>
                 <a:sym typeface="Aharoni"/>
               </a:rPr>
-              <a:t>Tripadvisor.</a:t>
+              <a:t>Tripadvisor</a:t>
             </a:r>
-            <a:endParaRPr/>
-          </a:p>
-          <a:p>
-            <a:pPr marL="0" marR="0" lvl="0" indent="0" algn="l" rtl="0">
-              <a:spcBef>
-                <a:spcPts val="0"/>
-              </a:spcBef>
-              <a:spcAft>
-                <a:spcPts val="0"/>
-              </a:spcAft>
-              <a:buNone/>
-            </a:pPr>
             <a:r>
-              <a:rPr lang="en-US" sz="1800">
+              <a:rPr lang="en-US" sz="6000" b="0" i="0" u="none" strike="noStrike" cap="none" dirty="0">
                 <a:solidFill>
                   <a:schemeClr val="dk1"/>
                 </a:solidFill>
@@ -13929,9 +13734,9 @@
                 <a:cs typeface="Aharoni"/>
                 <a:sym typeface="Aharoni"/>
               </a:rPr>
-              <a:t>Reseñas de visitas a hoteles</a:t>
+              <a:t>.</a:t>
             </a:r>
-            <a:endParaRPr/>
+            <a:endParaRPr dirty="0"/>
           </a:p>
           <a:p>
             <a:pPr marL="0" marR="0" lvl="0" indent="0" algn="l" rtl="0">
@@ -13943,7 +13748,43 @@
               </a:spcAft>
               <a:buNone/>
             </a:pPr>
-            <a:endParaRPr sz="1800">
+            <a:r>
+              <a:rPr lang="es-AR" sz="1800" dirty="0">
+                <a:solidFill>
+                  <a:schemeClr val="dk1"/>
+                </a:solidFill>
+                <a:latin typeface="Aharoni"/>
+                <a:ea typeface="Aharoni"/>
+                <a:cs typeface="Aharoni"/>
+                <a:sym typeface="Aharoni"/>
+              </a:rPr>
+              <a:t>Hotel </a:t>
+            </a:r>
+            <a:r>
+              <a:rPr lang="es-AR" sz="1800" dirty="0" err="1">
+                <a:solidFill>
+                  <a:schemeClr val="dk1"/>
+                </a:solidFill>
+                <a:latin typeface="Aharoni"/>
+                <a:ea typeface="Aharoni"/>
+                <a:cs typeface="Aharoni"/>
+                <a:sym typeface="Aharoni"/>
+              </a:rPr>
+              <a:t>Reviews</a:t>
+            </a:r>
+            <a:endParaRPr dirty="0"/>
+          </a:p>
+          <a:p>
+            <a:pPr marL="0" marR="0" lvl="0" indent="0" algn="l" rtl="0">
+              <a:spcBef>
+                <a:spcPts val="0"/>
+              </a:spcBef>
+              <a:spcAft>
+                <a:spcPts val="0"/>
+              </a:spcAft>
+              <a:buNone/>
+            </a:pPr>
+            <a:endParaRPr sz="1800" dirty="0">
               <a:solidFill>
                 <a:schemeClr val="dk1"/>
               </a:solidFill>
@@ -13963,7 +13804,7 @@
               </a:spcAft>
               <a:buNone/>
             </a:pPr>
-            <a:endParaRPr sz="1800" i="1">
+            <a:endParaRPr sz="1800" i="1" dirty="0">
               <a:solidFill>
                 <a:srgbClr val="7F7F7F"/>
               </a:solidFill>
@@ -14089,7 +13930,7 @@
         </p:nvSpPr>
         <p:spPr>
           <a:xfrm>
-            <a:off x="346710" y="351907"/>
+            <a:off x="306369" y="351907"/>
             <a:ext cx="6724650" cy="523220"/>
           </a:xfrm>
           <a:prstGeom prst="rect">
@@ -14201,7 +14042,7 @@
               <a:buNone/>
             </a:pPr>
             <a:r>
-              <a:rPr lang="en-US" sz="1800" b="1" u="sng">
+              <a:rPr lang="en-US" sz="1800" b="1" u="sng" dirty="0">
                 <a:solidFill>
                   <a:schemeClr val="dk1"/>
                 </a:solidFill>
@@ -14210,9 +14051,9 @@
                 <a:cs typeface="Arial"/>
                 <a:sym typeface="Arial"/>
               </a:rPr>
-              <a:t>Tópicos Promotores (reseñas positivas):</a:t>
+              <a:t>Promoter Topics (positive reviews)::</a:t>
             </a:r>
-            <a:endParaRPr/>
+            <a:endParaRPr dirty="0"/>
           </a:p>
           <a:p>
             <a:pPr marL="0" marR="0" lvl="0" indent="0" algn="just" rtl="0">
@@ -14224,7 +14065,7 @@
               </a:spcAft>
               <a:buNone/>
             </a:pPr>
-            <a:endParaRPr sz="1600" b="1" u="sng">
+            <a:endParaRPr sz="1600" b="1" u="sng" dirty="0">
               <a:solidFill>
                 <a:schemeClr val="dk1"/>
               </a:solidFill>
@@ -14250,7 +14091,7 @@
               <a:buChar char="•"/>
             </a:pPr>
             <a:r>
-              <a:rPr lang="en-US" sz="1800">
+              <a:rPr lang="en-US" sz="1800" dirty="0">
                 <a:solidFill>
                   <a:schemeClr val="dk1"/>
                 </a:solidFill>
@@ -14259,9 +14100,9 @@
                 <a:cs typeface="Arial"/>
                 <a:sym typeface="Arial"/>
               </a:rPr>
-              <a:t>Se centran principalmente en cuestiones relacionadas a infraestructura y al servicio recibido en los establecimientos.</a:t>
+              <a:t>They focus mainly on issues related to infrastructure and the service received in the establishments.</a:t>
             </a:r>
-            <a:endParaRPr/>
+            <a:endParaRPr dirty="0"/>
           </a:p>
           <a:p>
             <a:pPr marL="285750" marR="0" lvl="0" indent="-285750" algn="just" rtl="0">
@@ -14279,7 +14120,7 @@
               <a:buChar char="•"/>
             </a:pPr>
             <a:r>
-              <a:rPr lang="en-US" sz="1800">
+              <a:rPr lang="en-US" sz="1800" dirty="0">
                 <a:solidFill>
                   <a:schemeClr val="dk1"/>
                 </a:solidFill>
@@ -14288,9 +14129,9 @@
                 <a:cs typeface="Arial"/>
                 <a:sym typeface="Arial"/>
               </a:rPr>
-              <a:t>Los comentarios están concentrados en pocos tópicos.</a:t>
+              <a:t>The comments are concentrated on a few topics.</a:t>
             </a:r>
-            <a:endParaRPr/>
+            <a:endParaRPr dirty="0"/>
           </a:p>
           <a:p>
             <a:pPr marL="0" marR="0" lvl="0" indent="0" algn="just" rtl="0">
@@ -14302,7 +14143,7 @@
               </a:spcAft>
               <a:buNone/>
             </a:pPr>
-            <a:endParaRPr sz="1600">
+            <a:endParaRPr sz="1600" dirty="0">
               <a:solidFill>
                 <a:schemeClr val="dk1"/>
               </a:solidFill>
@@ -14322,7 +14163,7 @@
               </a:spcAft>
               <a:buNone/>
             </a:pPr>
-            <a:endParaRPr sz="1600">
+            <a:endParaRPr sz="1600" dirty="0">
               <a:solidFill>
                 <a:schemeClr val="dk1"/>
               </a:solidFill>
@@ -14343,7 +14184,7 @@
         <p:spPr>
           <a:xfrm>
             <a:off x="6381073" y="1258092"/>
-            <a:ext cx="5182277" cy="3693319"/>
+            <a:ext cx="5182277" cy="4524275"/>
           </a:xfrm>
           <a:prstGeom prst="rect">
             <a:avLst/>
@@ -14369,7 +14210,7 @@
               <a:buNone/>
             </a:pPr>
             <a:r>
-              <a:rPr lang="en-US" sz="1800" b="1" u="sng">
+              <a:rPr lang="en-US" sz="1800" b="1" u="sng" dirty="0">
                 <a:solidFill>
                   <a:schemeClr val="dk1"/>
                 </a:solidFill>
@@ -14378,9 +14219,8 @@
                 <a:cs typeface="Arial"/>
                 <a:sym typeface="Arial"/>
               </a:rPr>
-              <a:t>Tópicos Detractores (reseñas negativas):</a:t>
+              <a:t>Detractor Topics (negative reviews):</a:t>
             </a:r>
-            <a:endParaRPr/>
           </a:p>
           <a:p>
             <a:pPr marL="0" marR="0" lvl="0" indent="0" algn="just" rtl="0">
@@ -14392,7 +14232,7 @@
               </a:spcAft>
               <a:buNone/>
             </a:pPr>
-            <a:endParaRPr sz="1800" b="1" u="sng">
+            <a:endParaRPr sz="1800" b="1" u="sng" dirty="0">
               <a:solidFill>
                 <a:schemeClr val="dk1"/>
               </a:solidFill>
@@ -14418,7 +14258,7 @@
               <a:buChar char="•"/>
             </a:pPr>
             <a:r>
-              <a:rPr lang="en-US" sz="1800">
+              <a:rPr lang="en-US" sz="1800" dirty="0">
                 <a:solidFill>
                   <a:schemeClr val="dk1"/>
                 </a:solidFill>
@@ -14427,9 +14267,8 @@
                 <a:cs typeface="Arial"/>
                 <a:sym typeface="Arial"/>
               </a:rPr>
-              <a:t>El tópico que contiene experiencias relacionadas al check-in, check-out, reservas, etc., es el único que no se solapa con algún aspecto de los tópicos promotores.</a:t>
+              <a:t>The topic that contains experiences related to check-in, check-out, reservations, etc., is the only one that does not overlap with any aspect of the promoter topics. From this, it is concluded that a good experience is taken for granted when entering or leaving the hotel and not obtaining it is the reason for a negative review.</a:t>
             </a:r>
-            <a:endParaRPr/>
           </a:p>
           <a:p>
             <a:pPr marL="285750" marR="0" lvl="0" indent="-285750" algn="just" rtl="0">
@@ -14447,7 +14286,7 @@
               <a:buChar char="•"/>
             </a:pPr>
             <a:r>
-              <a:rPr lang="en-US" sz="1800">
+              <a:rPr lang="en-US" sz="1800" dirty="0">
                 <a:solidFill>
                   <a:schemeClr val="dk1"/>
                 </a:solidFill>
@@ -14456,9 +14295,9 @@
                 <a:cs typeface="Arial"/>
                 <a:sym typeface="Arial"/>
               </a:rPr>
-              <a:t>Parecería que cuestiones tales como la falta de confort de las habitaciones es un causante de malas reseñas.</a:t>
+              <a:t>It seems that issues such as the lack of comfort in the rooms cause bad reviews.</a:t>
             </a:r>
-            <a:endParaRPr/>
+            <a:endParaRPr dirty="0"/>
           </a:p>
           <a:p>
             <a:pPr marL="285750" marR="0" lvl="0" indent="-285750" algn="just" rtl="0">
@@ -14476,7 +14315,7 @@
               <a:buChar char="•"/>
             </a:pPr>
             <a:r>
-              <a:rPr lang="en-US" sz="1800">
+              <a:rPr lang="en-US" sz="1800" dirty="0">
                 <a:solidFill>
                   <a:schemeClr val="dk1"/>
                 </a:solidFill>
@@ -14485,9 +14324,9 @@
                 <a:cs typeface="Arial"/>
                 <a:sym typeface="Arial"/>
               </a:rPr>
-              <a:t>El tópico 0 y 2 tiene muchos puntos en común con los promotores.</a:t>
+              <a:t>Topic 0 and 2 have many points in common with promoters.</a:t>
             </a:r>
-            <a:endParaRPr/>
+            <a:endParaRPr dirty="0"/>
           </a:p>
           <a:p>
             <a:pPr marL="285750" marR="0" lvl="0" indent="-285750" algn="just" rtl="0">
@@ -14505,7 +14344,7 @@
               <a:buChar char="•"/>
             </a:pPr>
             <a:r>
-              <a:rPr lang="en-US" sz="1800">
+              <a:rPr lang="en-US" sz="1800" dirty="0">
                 <a:solidFill>
                   <a:schemeClr val="dk1"/>
                 </a:solidFill>
@@ -14514,9 +14353,9 @@
                 <a:cs typeface="Arial"/>
                 <a:sym typeface="Arial"/>
               </a:rPr>
-              <a:t>A pesar de tener menos registros, se logró extraer más tópicos de los detractores.</a:t>
+              <a:t>Despite having fewer records, it was possible to extract more topics from detractors.</a:t>
             </a:r>
-            <a:endParaRPr/>
+            <a:endParaRPr dirty="0"/>
           </a:p>
         </p:txBody>
       </p:sp>
@@ -14547,6 +14386,223 @@
           </a:ln>
         </p:spPr>
       </p:pic>
+      <p:sp>
+        <p:nvSpPr>
+          <p:cNvPr id="3" name="Rectangle 2">
+            <a:extLst>
+              <a:ext uri="{FF2B5EF4-FFF2-40B4-BE49-F238E27FC236}">
+                <a16:creationId xmlns:a16="http://schemas.microsoft.com/office/drawing/2014/main" id="{E4A9DCD3-FA43-40B0-B491-50B8E630C1AB}"/>
+              </a:ext>
+            </a:extLst>
+          </p:cNvPr>
+          <p:cNvSpPr>
+            <a:spLocks noChangeArrowheads="1"/>
+          </p:cNvSpPr>
+          <p:nvPr/>
+        </p:nvSpPr>
+        <p:spPr bwMode="auto">
+          <a:xfrm>
+            <a:off x="152400" y="152400"/>
+            <a:ext cx="12192000" cy="0"/>
+          </a:xfrm>
+          <a:prstGeom prst="rect">
+            <a:avLst/>
+          </a:prstGeom>
+          <a:solidFill>
+            <a:srgbClr val="F5F5F5"/>
+          </a:solidFill>
+          <a:ln>
+            <a:noFill/>
+          </a:ln>
+          <a:effectLst/>
+          <a:extLst>
+            <a:ext uri="{91240B29-F687-4F45-9708-019B960494DF}">
+              <a14:hiddenLine xmlns:a14="http://schemas.microsoft.com/office/drawing/2010/main" w="9525">
+                <a:solidFill>
+                  <a:schemeClr val="tx1"/>
+                </a:solidFill>
+                <a:miter lim="800000"/>
+                <a:headEnd/>
+                <a:tailEnd/>
+              </a14:hiddenLine>
+            </a:ext>
+            <a:ext uri="{AF507438-7753-43E0-B8FC-AC1667EBCBE1}">
+              <a14:hiddenEffects xmlns:a14="http://schemas.microsoft.com/office/drawing/2010/main">
+                <a:effectLst>
+                  <a:outerShdw dist="35921" dir="2700000" algn="ctr" rotWithShape="0">
+                    <a:schemeClr val="bg2"/>
+                  </a:outerShdw>
+                </a:effectLst>
+              </a14:hiddenEffects>
+            </a:ext>
+          </a:extLst>
+        </p:spPr>
+        <p:txBody>
+          <a:bodyPr vert="horz" wrap="none" lIns="91440" tIns="45720" rIns="91440" bIns="45720" numCol="1" anchor="ctr" anchorCtr="0" compatLnSpc="1">
+            <a:prstTxWarp prst="textNoShape">
+              <a:avLst/>
+            </a:prstTxWarp>
+            <a:spAutoFit/>
+          </a:bodyPr>
+          <a:lstStyle/>
+          <a:p>
+            <a:endParaRPr lang="es-AR"/>
+          </a:p>
+        </p:txBody>
+      </p:sp>
+      <p:sp>
+        <p:nvSpPr>
+          <p:cNvPr id="5" name="Rectangle 4">
+            <a:extLst>
+              <a:ext uri="{FF2B5EF4-FFF2-40B4-BE49-F238E27FC236}">
+                <a16:creationId xmlns:a16="http://schemas.microsoft.com/office/drawing/2014/main" id="{ACB9A18F-1B6F-44F1-9CB6-6488E0CEAF7E}"/>
+              </a:ext>
+            </a:extLst>
+          </p:cNvPr>
+          <p:cNvSpPr>
+            <a:spLocks noChangeArrowheads="1"/>
+          </p:cNvSpPr>
+          <p:nvPr/>
+        </p:nvSpPr>
+        <p:spPr bwMode="auto">
+          <a:xfrm>
+            <a:off x="152400" y="13900"/>
+            <a:ext cx="65" cy="276999"/>
+          </a:xfrm>
+          <a:prstGeom prst="rect">
+            <a:avLst/>
+          </a:prstGeom>
+          <a:solidFill>
+            <a:srgbClr val="F5F5F5"/>
+          </a:solidFill>
+          <a:ln>
+            <a:noFill/>
+          </a:ln>
+          <a:effectLst/>
+          <a:extLst>
+            <a:ext uri="{91240B29-F687-4F45-9708-019B960494DF}">
+              <a14:hiddenLine xmlns:a14="http://schemas.microsoft.com/office/drawing/2010/main" w="9525">
+                <a:solidFill>
+                  <a:schemeClr val="tx1"/>
+                </a:solidFill>
+                <a:miter lim="800000"/>
+                <a:headEnd/>
+                <a:tailEnd/>
+              </a14:hiddenLine>
+            </a:ext>
+            <a:ext uri="{AF507438-7753-43E0-B8FC-AC1667EBCBE1}">
+              <a14:hiddenEffects xmlns:a14="http://schemas.microsoft.com/office/drawing/2010/main">
+                <a:effectLst>
+                  <a:outerShdw dist="35921" dir="2700000" algn="ctr" rotWithShape="0">
+                    <a:schemeClr val="bg2"/>
+                  </a:outerShdw>
+                </a:effectLst>
+              </a14:hiddenEffects>
+            </a:ext>
+          </a:extLst>
+        </p:spPr>
+        <p:txBody>
+          <a:bodyPr vert="horz" wrap="none" lIns="0" tIns="0" rIns="0" bIns="0" numCol="1" anchor="ctr" anchorCtr="0" compatLnSpc="1">
+            <a:prstTxWarp prst="textNoShape">
+              <a:avLst/>
+            </a:prstTxWarp>
+            <a:spAutoFit/>
+          </a:bodyPr>
+          <a:lstStyle/>
+          <a:p>
+            <a:pPr marL="0" marR="0" lvl="0" indent="0" algn="l" defTabSz="914400" rtl="0" eaLnBrk="0" fontAlgn="base" latinLnBrk="0" hangingPunct="0">
+              <a:lnSpc>
+                <a:spcPct val="100000"/>
+              </a:lnSpc>
+              <a:spcBef>
+                <a:spcPct val="0"/>
+              </a:spcBef>
+              <a:spcAft>
+                <a:spcPct val="0"/>
+              </a:spcAft>
+              <a:buClrTx/>
+              <a:buSzTx/>
+              <a:buFontTx/>
+              <a:buNone/>
+              <a:tabLst/>
+            </a:pPr>
+            <a:endParaRPr kumimoji="0" lang="es-AR" altLang="es-AR" sz="1800" b="0" i="0" u="none" strike="noStrike" cap="none" normalizeH="0" baseline="0" dirty="0">
+              <a:ln>
+                <a:noFill/>
+              </a:ln>
+              <a:solidFill>
+                <a:schemeClr val="tx1"/>
+              </a:solidFill>
+              <a:effectLst/>
+              <a:latin typeface="Arial" panose="020B0604020202020204" pitchFamily="34" charset="0"/>
+            </a:endParaRPr>
+          </a:p>
+        </p:txBody>
+      </p:sp>
+      <p:sp>
+        <p:nvSpPr>
+          <p:cNvPr id="6" name="Rectangle 5">
+            <a:extLst>
+              <a:ext uri="{FF2B5EF4-FFF2-40B4-BE49-F238E27FC236}">
+                <a16:creationId xmlns:a16="http://schemas.microsoft.com/office/drawing/2014/main" id="{3EFB092B-6C0E-4E20-887D-15A389AD5F82}"/>
+              </a:ext>
+            </a:extLst>
+          </p:cNvPr>
+          <p:cNvSpPr>
+            <a:spLocks noChangeArrowheads="1"/>
+          </p:cNvSpPr>
+          <p:nvPr/>
+        </p:nvSpPr>
+        <p:spPr bwMode="auto">
+          <a:xfrm>
+            <a:off x="152400" y="152400"/>
+            <a:ext cx="12192000" cy="0"/>
+          </a:xfrm>
+          <a:prstGeom prst="rect">
+            <a:avLst/>
+          </a:prstGeom>
+          <a:solidFill>
+            <a:srgbClr val="F5F5F5"/>
+          </a:solidFill>
+          <a:ln>
+            <a:noFill/>
+          </a:ln>
+          <a:effectLst/>
+          <a:extLst>
+            <a:ext uri="{91240B29-F687-4F45-9708-019B960494DF}">
+              <a14:hiddenLine xmlns:a14="http://schemas.microsoft.com/office/drawing/2010/main" w="9525">
+                <a:solidFill>
+                  <a:schemeClr val="tx1"/>
+                </a:solidFill>
+                <a:miter lim="800000"/>
+                <a:headEnd/>
+                <a:tailEnd/>
+              </a14:hiddenLine>
+            </a:ext>
+            <a:ext uri="{AF507438-7753-43E0-B8FC-AC1667EBCBE1}">
+              <a14:hiddenEffects xmlns:a14="http://schemas.microsoft.com/office/drawing/2010/main">
+                <a:effectLst>
+                  <a:outerShdw dist="35921" dir="2700000" algn="ctr" rotWithShape="0">
+                    <a:schemeClr val="bg2"/>
+                  </a:outerShdw>
+                </a:effectLst>
+              </a14:hiddenEffects>
+            </a:ext>
+          </a:extLst>
+        </p:spPr>
+        <p:txBody>
+          <a:bodyPr vert="horz" wrap="none" lIns="91440" tIns="45720" rIns="91440" bIns="45720" numCol="1" anchor="ctr" anchorCtr="0" compatLnSpc="1">
+            <a:prstTxWarp prst="textNoShape">
+              <a:avLst/>
+            </a:prstTxWarp>
+            <a:spAutoFit/>
+          </a:bodyPr>
+          <a:lstStyle/>
+          <a:p>
+            <a:endParaRPr lang="es-AR"/>
+          </a:p>
+        </p:txBody>
+      </p:sp>
     </p:spTree>
   </p:cSld>
   <p:clrMapOvr>
@@ -14634,7 +14690,7 @@
               <a:buNone/>
             </a:pPr>
             <a:r>
-              <a:rPr lang="en-US" sz="2800">
+              <a:rPr lang="en-US" sz="2800" dirty="0" err="1">
                 <a:solidFill>
                   <a:schemeClr val="dk1"/>
                 </a:solidFill>
@@ -14643,9 +14699,9 @@
                 <a:cs typeface="Aharoni"/>
                 <a:sym typeface="Aharoni"/>
               </a:rPr>
-              <a:t>Conclusiones</a:t>
+              <a:t>Conclussions</a:t>
             </a:r>
-            <a:endParaRPr/>
+            <a:endParaRPr dirty="0"/>
           </a:p>
         </p:txBody>
       </p:sp>
@@ -14684,7 +14740,7 @@
               <a:buNone/>
             </a:pPr>
             <a:r>
-              <a:rPr lang="en-US" sz="1800" b="1" i="1" u="sng">
+              <a:rPr lang="en-US" sz="1800" b="1" i="1" u="sng" dirty="0">
                 <a:solidFill>
                   <a:schemeClr val="dk1"/>
                 </a:solidFill>
@@ -14693,9 +14749,9 @@
                 <a:cs typeface="Arial"/>
                 <a:sym typeface="Arial"/>
               </a:rPr>
-              <a:t>Clasificación:</a:t>
+              <a:t>Classification:</a:t>
             </a:r>
-            <a:endParaRPr sz="1800">
+            <a:endParaRPr sz="1800" dirty="0">
               <a:solidFill>
                 <a:schemeClr val="dk1"/>
               </a:solidFill>
@@ -14721,7 +14777,7 @@
               <a:buChar char="•"/>
             </a:pPr>
             <a:r>
-              <a:rPr lang="en-US" sz="1800">
+              <a:rPr lang="en-US" sz="1800" dirty="0">
                 <a:solidFill>
                   <a:schemeClr val="dk1"/>
                 </a:solidFill>
@@ -14730,9 +14786,9 @@
                 <a:cs typeface="Arial"/>
                 <a:sym typeface="Arial"/>
               </a:rPr>
-              <a:t>Imposibilidad de identificar comentarios neutros ya que eran muy similares a los negativos.</a:t>
+              <a:t>Impossibility of identifying neutral comments as they were very similar to the negative ones..</a:t>
             </a:r>
-            <a:endParaRPr/>
+            <a:endParaRPr dirty="0"/>
           </a:p>
           <a:p>
             <a:pPr marL="285750" marR="0" lvl="0" indent="-285750" algn="just" rtl="0">
@@ -14750,7 +14806,7 @@
               <a:buChar char="•"/>
             </a:pPr>
             <a:r>
-              <a:rPr lang="en-US" sz="1800">
+              <a:rPr lang="en-US" sz="1800" dirty="0">
                 <a:solidFill>
                   <a:schemeClr val="dk1"/>
                 </a:solidFill>
@@ -14759,9 +14815,9 @@
                 <a:cs typeface="Arial"/>
                 <a:sym typeface="Arial"/>
               </a:rPr>
-              <a:t>Un dataset de entrenamiento con más columnas que observaciones.</a:t>
+              <a:t>A training dataset with more columns than observations.</a:t>
             </a:r>
-            <a:endParaRPr/>
+            <a:endParaRPr dirty="0"/>
           </a:p>
           <a:p>
             <a:pPr marL="285750" marR="0" lvl="0" indent="-285750" algn="just" rtl="0">
@@ -14779,7 +14835,7 @@
               <a:buChar char="•"/>
             </a:pPr>
             <a:r>
-              <a:rPr lang="en-US" sz="1800">
+              <a:rPr lang="en-US" sz="1800" dirty="0">
                 <a:solidFill>
                   <a:schemeClr val="dk1"/>
                 </a:solidFill>
@@ -14788,9 +14844,9 @@
                 <a:cs typeface="Arial"/>
                 <a:sym typeface="Arial"/>
               </a:rPr>
-              <a:t>Puntos de mejora: </a:t>
+              <a:t>Improvement points: </a:t>
             </a:r>
-            <a:endParaRPr/>
+            <a:endParaRPr dirty="0"/>
           </a:p>
           <a:p>
             <a:pPr marL="742950" marR="0" lvl="1" indent="-285750" algn="just" rtl="0">
@@ -14808,7 +14864,7 @@
               <a:buChar char="•"/>
             </a:pPr>
             <a:r>
-              <a:rPr lang="en-US" sz="1600" b="0" i="0" u="none" strike="noStrike" cap="none">
+              <a:rPr lang="en-US" sz="1600" b="0" i="0" u="none" strike="noStrike" cap="none" dirty="0">
                 <a:solidFill>
                   <a:schemeClr val="dk1"/>
                 </a:solidFill>
@@ -14817,38 +14873,9 @@
                 <a:cs typeface="Arial"/>
                 <a:sym typeface="Arial"/>
               </a:rPr>
-              <a:t>Realizar optimización de hiper parámetros para el lightgbm.</a:t>
+              <a:t>Deepen the analysis of bigrams, especially for cases in which the combination of two words changes the meaning of one of them alone ( example: “not good”).</a:t>
             </a:r>
-            <a:endParaRPr/>
-          </a:p>
-          <a:p>
-            <a:pPr marL="742950" marR="0" lvl="1" indent="-285750" algn="just" rtl="0">
-              <a:spcBef>
-                <a:spcPts val="0"/>
-              </a:spcBef>
-              <a:spcAft>
-                <a:spcPts val="0"/>
-              </a:spcAft>
-              <a:buClr>
-                <a:schemeClr val="dk1"/>
-              </a:buClr>
-              <a:buSzPts val="1600"/>
-              <a:buFont typeface="Arial"/>
-              <a:buChar char="•"/>
-            </a:pPr>
-            <a:r>
-              <a:rPr lang="en-US" sz="1600" b="0" i="0" u="none" strike="noStrike" cap="none">
-                <a:solidFill>
-                  <a:schemeClr val="dk1"/>
-                </a:solidFill>
-                <a:latin typeface="Arial"/>
-                <a:ea typeface="Arial"/>
-                <a:cs typeface="Arial"/>
-                <a:sym typeface="Arial"/>
-              </a:rPr>
-              <a:t>Profundizar el análisis de bigramas, sobre todo para casos en los que la combinación de dos palabras cambia el significado de alguna de ellas sola (EJ: “not good”).</a:t>
-            </a:r>
-            <a:endParaRPr/>
+            <a:endParaRPr dirty="0"/>
           </a:p>
           <a:p>
             <a:pPr marL="0" marR="0" lvl="0" indent="0" algn="just" rtl="0">
@@ -14860,7 +14887,7 @@
               </a:spcAft>
               <a:buNone/>
             </a:pPr>
-            <a:endParaRPr sz="1800">
+            <a:endParaRPr sz="1800" dirty="0">
               <a:solidFill>
                 <a:schemeClr val="dk1"/>
               </a:solidFill>
@@ -14881,7 +14908,7 @@
               <a:buNone/>
             </a:pPr>
             <a:r>
-              <a:rPr lang="en-US" sz="1800" b="1" i="1" u="sng">
+              <a:rPr lang="en-US" sz="1800" b="1" i="1" u="sng" dirty="0">
                 <a:solidFill>
                   <a:schemeClr val="dk1"/>
                 </a:solidFill>
@@ -14890,9 +14917,9 @@
                 <a:cs typeface="Arial"/>
                 <a:sym typeface="Arial"/>
               </a:rPr>
-              <a:t>Análisis de Tópicos:</a:t>
+              <a:t>Topic Analysis:</a:t>
             </a:r>
-            <a:endParaRPr/>
+            <a:endParaRPr dirty="0"/>
           </a:p>
           <a:p>
             <a:pPr marL="285750" marR="0" lvl="0" indent="-285750" algn="just" rtl="0">
@@ -14910,7 +14937,7 @@
               <a:buChar char="•"/>
             </a:pPr>
             <a:r>
-              <a:rPr lang="en-US" sz="1800">
+              <a:rPr lang="en-US" sz="1800" dirty="0">
                 <a:solidFill>
                   <a:schemeClr val="dk1"/>
                 </a:solidFill>
@@ -14919,9 +14946,9 @@
                 <a:cs typeface="Arial"/>
                 <a:sym typeface="Arial"/>
               </a:rPr>
-              <a:t>Al aumentar la cantidad de tópicos se observa solapamiento entre ellos y tópicos con muy pocas palabras.</a:t>
+              <a:t>As the number of topics increases, overlapping is observed between them and topics with very few words.</a:t>
             </a:r>
-            <a:endParaRPr/>
+            <a:endParaRPr dirty="0"/>
           </a:p>
           <a:p>
             <a:pPr marL="285750" marR="0" lvl="0" indent="-285750" algn="just" rtl="0">
@@ -14939,7 +14966,7 @@
               <a:buChar char="•"/>
             </a:pPr>
             <a:r>
-              <a:rPr lang="en-US" sz="1800">
+              <a:rPr lang="en-US" sz="1800" dirty="0">
                 <a:solidFill>
                   <a:schemeClr val="dk1"/>
                 </a:solidFill>
@@ -14948,27 +14975,10 @@
                 <a:cs typeface="Arial"/>
                 <a:sym typeface="Arial"/>
               </a:rPr>
-              <a:t>Las palabras clave para la clasificación son ruido para el análisis de tópicos (Ej: adjetivos).</a:t>
+              <a:t>Keywords for classification are noise for topic analysis (</a:t>
             </a:r>
-            <a:endParaRPr/>
-          </a:p>
-          <a:p>
-            <a:pPr marL="285750" marR="0" lvl="0" indent="-285750" algn="just" rtl="0">
-              <a:spcBef>
-                <a:spcPts val="0"/>
-              </a:spcBef>
-              <a:spcAft>
-                <a:spcPts val="0"/>
-              </a:spcAft>
-              <a:buClr>
-                <a:schemeClr val="dk1"/>
-              </a:buClr>
-              <a:buSzPts val="1800"/>
-              <a:buFont typeface="Arial"/>
-              <a:buChar char="•"/>
-            </a:pPr>
             <a:r>
-              <a:rPr lang="en-US" sz="1800">
+              <a:rPr lang="en-US" sz="1800" dirty="0" err="1">
                 <a:solidFill>
                   <a:schemeClr val="dk1"/>
                 </a:solidFill>
@@ -14977,27 +14987,10 @@
                 <a:cs typeface="Arial"/>
                 <a:sym typeface="Arial"/>
               </a:rPr>
-              <a:t>Puntos de mejora: </a:t>
+              <a:t>eg</a:t>
             </a:r>
-            <a:endParaRPr/>
-          </a:p>
-          <a:p>
-            <a:pPr marL="742950" marR="0" lvl="1" indent="-285750" algn="just" rtl="0">
-              <a:spcBef>
-                <a:spcPts val="0"/>
-              </a:spcBef>
-              <a:spcAft>
-                <a:spcPts val="0"/>
-              </a:spcAft>
-              <a:buClr>
-                <a:schemeClr val="dk1"/>
-              </a:buClr>
-              <a:buSzPts val="1600"/>
-              <a:buFont typeface="Arial"/>
-              <a:buChar char="•"/>
-            </a:pPr>
             <a:r>
-              <a:rPr lang="en-US" sz="1600" b="0" i="0" u="none" strike="noStrike" cap="none">
+              <a:rPr lang="en-US" sz="1800" dirty="0">
                 <a:solidFill>
                   <a:schemeClr val="dk1"/>
                 </a:solidFill>
@@ -15006,10 +14999,27 @@
                 <a:cs typeface="Arial"/>
                 <a:sym typeface="Arial"/>
               </a:rPr>
-              <a:t>Profundizar la limpieza del dataset (</a:t>
+              <a:t>: adjectives).</a:t>
             </a:r>
+            <a:endParaRPr dirty="0"/>
+          </a:p>
+          <a:p>
+            <a:pPr marL="285750" marR="0" lvl="0" indent="-285750" algn="just" rtl="0">
+              <a:spcBef>
+                <a:spcPts val="0"/>
+              </a:spcBef>
+              <a:spcAft>
+                <a:spcPts val="0"/>
+              </a:spcAft>
+              <a:buClr>
+                <a:schemeClr val="dk1"/>
+              </a:buClr>
+              <a:buSzPts val="1800"/>
+              <a:buFont typeface="Arial"/>
+              <a:buChar char="•"/>
+            </a:pPr>
             <a:r>
-              <a:rPr lang="en-US" sz="1600" b="0" i="0" u="sng" strike="noStrike" cap="none">
+              <a:rPr lang="en-US" sz="1800" dirty="0">
                 <a:solidFill>
                   <a:schemeClr val="dk1"/>
                 </a:solidFill>
@@ -15018,10 +15028,27 @@
                 <a:cs typeface="Arial"/>
                 <a:sym typeface="Arial"/>
               </a:rPr>
-              <a:t>Ej</a:t>
+              <a:t>Improvement points : </a:t>
             </a:r>
+            <a:endParaRPr dirty="0"/>
+          </a:p>
+          <a:p>
+            <a:pPr marL="742950" marR="0" lvl="1" indent="-285750" algn="just" rtl="0">
+              <a:spcBef>
+                <a:spcPts val="0"/>
+              </a:spcBef>
+              <a:spcAft>
+                <a:spcPts val="0"/>
+              </a:spcAft>
+              <a:buClr>
+                <a:schemeClr val="dk1"/>
+              </a:buClr>
+              <a:buSzPts val="1600"/>
+              <a:buFont typeface="Arial"/>
+              <a:buChar char="•"/>
+            </a:pPr>
             <a:r>
-              <a:rPr lang="en-US" sz="1600" b="0" i="0" u="none" strike="noStrike" cap="none">
+              <a:rPr lang="en-US" sz="1600" b="0" i="0" u="none" strike="noStrike" cap="none" dirty="0">
                 <a:solidFill>
                   <a:schemeClr val="dk1"/>
                 </a:solidFill>
@@ -15030,9 +15057,33 @@
                 <a:cs typeface="Arial"/>
                 <a:sym typeface="Arial"/>
               </a:rPr>
-              <a:t>: remoción de adjetivos).</a:t>
+              <a:t>Deepen the cleaning of the dataset (</a:t>
             </a:r>
-            <a:endParaRPr/>
+            <a:r>
+              <a:rPr lang="en-US" sz="1600" b="0" i="0" u="none" strike="noStrike" cap="none" dirty="0" err="1">
+                <a:solidFill>
+                  <a:schemeClr val="dk1"/>
+                </a:solidFill>
+                <a:latin typeface="Arial"/>
+                <a:ea typeface="Arial"/>
+                <a:cs typeface="Arial"/>
+                <a:sym typeface="Arial"/>
+              </a:rPr>
+              <a:t>eg</a:t>
+            </a:r>
+            <a:r>
+              <a:rPr lang="en-US" sz="1600" b="0" i="0" u="none" strike="noStrike" cap="none" dirty="0">
+                <a:solidFill>
+                  <a:schemeClr val="dk1"/>
+                </a:solidFill>
+                <a:latin typeface="Arial"/>
+                <a:ea typeface="Arial"/>
+                <a:cs typeface="Arial"/>
+                <a:sym typeface="Arial"/>
+              </a:rPr>
+              <a:t>: removal of adjectives).</a:t>
+            </a:r>
+            <a:endParaRPr dirty="0"/>
           </a:p>
         </p:txBody>
       </p:sp>
@@ -15063,128 +15114,6 @@
           </a:ln>
         </p:spPr>
       </p:pic>
-    </p:spTree>
-  </p:cSld>
-  <p:clrMapOvr>
-    <a:masterClrMapping/>
-  </p:clrMapOvr>
-</p:sld>
-</file>
-
-<file path=ppt/slides/slide12.xml><?xml version="1.0" encoding="utf-8"?>
-<p:sld xmlns:a="http://schemas.openxmlformats.org/drawingml/2006/main" xmlns:r="http://schemas.openxmlformats.org/officeDocument/2006/relationships" xmlns:p="http://schemas.openxmlformats.org/presentationml/2006/main">
-  <p:cSld>
-    <p:bg>
-      <p:bgPr>
-        <a:blipFill>
-          <a:blip r:embed="rId3">
-            <a:alphaModFix/>
-          </a:blip>
-          <a:stretch>
-            <a:fillRect/>
-          </a:stretch>
-        </a:blipFill>
-        <a:effectLst/>
-      </p:bgPr>
-    </p:bg>
-    <p:spTree>
-      <p:nvGrpSpPr>
-        <p:cNvPr id="1" name="Shape 210"/>
-        <p:cNvGrpSpPr/>
-        <p:nvPr/>
-      </p:nvGrpSpPr>
-      <p:grpSpPr>
-        <a:xfrm>
-          <a:off x="0" y="0"/>
-          <a:ext cx="0" cy="0"/>
-          <a:chOff x="0" y="0"/>
-          <a:chExt cx="0" cy="0"/>
-        </a:xfrm>
-      </p:grpSpPr>
-      <p:sp>
-        <p:nvSpPr>
-          <p:cNvPr id="211" name="Google Shape;211;p12"/>
-          <p:cNvSpPr/>
-          <p:nvPr/>
-        </p:nvSpPr>
-        <p:spPr>
-          <a:xfrm>
-            <a:off x="1524" y="0"/>
-            <a:ext cx="12188952" cy="6858000"/>
-          </a:xfrm>
-          <a:prstGeom prst="rect">
-            <a:avLst/>
-          </a:prstGeom>
-          <a:noFill/>
-          <a:ln>
-            <a:noFill/>
-          </a:ln>
-        </p:spPr>
-        <p:txBody>
-          <a:bodyPr spcFirstLastPara="1" wrap="square" lIns="91425" tIns="45700" rIns="91425" bIns="45700" anchor="ctr" anchorCtr="0">
-            <a:noAutofit/>
-          </a:bodyPr>
-          <a:lstStyle/>
-          <a:p>
-            <a:pPr marL="0" marR="0" lvl="0" indent="0" algn="ctr" rtl="0">
-              <a:spcBef>
-                <a:spcPts val="0"/>
-              </a:spcBef>
-              <a:spcAft>
-                <a:spcPts val="0"/>
-              </a:spcAft>
-              <a:buNone/>
-            </a:pPr>
-            <a:endParaRPr sz="1800">
-              <a:solidFill>
-                <a:schemeClr val="lt1"/>
-              </a:solidFill>
-              <a:latin typeface="Calibri"/>
-              <a:ea typeface="Calibri"/>
-              <a:cs typeface="Calibri"/>
-              <a:sym typeface="Calibri"/>
-            </a:endParaRPr>
-          </a:p>
-        </p:txBody>
-      </p:sp>
-    </p:spTree>
-  </p:cSld>
-  <p:clrMapOvr>
-    <a:masterClrMapping/>
-  </p:clrMapOvr>
-</p:sld>
-</file>
-
-<file path=ppt/slides/slide13.xml><?xml version="1.0" encoding="utf-8"?>
-<p:sld xmlns:a="http://schemas.openxmlformats.org/drawingml/2006/main" xmlns:r="http://schemas.openxmlformats.org/officeDocument/2006/relationships" xmlns:p="http://schemas.openxmlformats.org/presentationml/2006/main">
-  <p:cSld>
-    <p:bg>
-      <p:bgPr>
-        <a:blipFill>
-          <a:blip r:embed="rId3">
-            <a:alphaModFix/>
-          </a:blip>
-          <a:stretch>
-            <a:fillRect/>
-          </a:stretch>
-        </a:blipFill>
-        <a:effectLst/>
-      </p:bgPr>
-    </p:bg>
-    <p:spTree>
-      <p:nvGrpSpPr>
-        <p:cNvPr id="1" name="Shape 215"/>
-        <p:cNvGrpSpPr/>
-        <p:nvPr/>
-      </p:nvGrpSpPr>
-      <p:grpSpPr>
-        <a:xfrm>
-          <a:off x="0" y="0"/>
-          <a:ext cx="0" cy="0"/>
-          <a:chOff x="0" y="0"/>
-          <a:chExt cx="0" cy="0"/>
-        </a:xfrm>
-      </p:grpSpPr>
     </p:spTree>
   </p:cSld>
   <p:clrMapOvr>
@@ -15245,7 +15174,7 @@
         </p:nvSpPr>
         <p:spPr>
           <a:xfrm>
-            <a:off x="244210" y="5387650"/>
+            <a:off x="247997" y="5462095"/>
             <a:ext cx="8330100" cy="1337400"/>
           </a:xfrm>
           <a:prstGeom prst="snip1Rect">
@@ -15349,7 +15278,7 @@
               <a:buNone/>
             </a:pPr>
             <a:r>
-              <a:rPr lang="en-US" sz="2800">
+              <a:rPr lang="en-US" sz="2800" dirty="0">
                 <a:solidFill>
                   <a:schemeClr val="dk1"/>
                 </a:solidFill>
@@ -15358,9 +15287,9 @@
                 <a:cs typeface="Aharoni"/>
                 <a:sym typeface="Aharoni"/>
               </a:rPr>
-              <a:t>Caso de Negocio</a:t>
+              <a:t>Business Case</a:t>
             </a:r>
-            <a:endParaRPr sz="2800">
+            <a:endParaRPr sz="2800" dirty="0">
               <a:solidFill>
                 <a:schemeClr val="dk1"/>
               </a:solidFill>
@@ -15381,7 +15310,7 @@
         <p:spPr>
           <a:xfrm>
             <a:off x="320733" y="933634"/>
-            <a:ext cx="7902285" cy="5478423"/>
+            <a:ext cx="7902285" cy="5940047"/>
           </a:xfrm>
           <a:prstGeom prst="rect">
             <a:avLst/>
@@ -15407,7 +15336,7 @@
               <a:buNone/>
             </a:pPr>
             <a:r>
-              <a:rPr lang="en-US" sz="2000">
+              <a:rPr lang="en-US" sz="2000" dirty="0">
                 <a:solidFill>
                   <a:schemeClr val="dk1"/>
                 </a:solidFill>
@@ -15416,22 +15345,29 @@
                 <a:cs typeface="Arial"/>
                 <a:sym typeface="Arial"/>
               </a:rPr>
-              <a:t>El modelo de negocios de un hotel se basa en ofrecer la mayor cantidad de servicios posibles bajo un modelo de pricing específico, que permita que cada huésped viva la mejor experiencia posible. </a:t>
+              <a:t>The business model of a hotel is based on offering the greatest number of services possible under a specific pricing model, which allows each guest to have the best possible experience.</a:t>
             </a:r>
-            <a:endParaRPr sz="2000">
+          </a:p>
+          <a:p>
+            <a:pPr marL="0" marR="0" lvl="0" indent="0" algn="just" rtl="0">
+              <a:spcBef>
+                <a:spcPts val="0"/>
+              </a:spcBef>
+              <a:spcAft>
+                <a:spcPts val="0"/>
+              </a:spcAft>
+              <a:buNone/>
+            </a:pPr>
+            <a:endParaRPr lang="en-US" sz="2000" dirty="0">
               <a:solidFill>
                 <a:schemeClr val="dk1"/>
               </a:solidFill>
-              <a:latin typeface="Arial"/>
-              <a:ea typeface="Arial"/>
-              <a:cs typeface="Arial"/>
-              <a:sym typeface="Arial"/>
             </a:endParaRPr>
           </a:p>
           <a:p>
             <a:pPr marL="0" marR="0" lvl="0" indent="0" algn="just" rtl="0">
               <a:spcBef>
-                <a:spcPts val="1200"/>
+                <a:spcPts val="0"/>
               </a:spcBef>
               <a:spcAft>
                 <a:spcPts val="0"/>
@@ -15439,7 +15375,7 @@
               <a:buNone/>
             </a:pPr>
             <a:r>
-              <a:rPr lang="en-US" sz="2000">
+              <a:rPr lang="en-US" sz="2000" dirty="0">
                 <a:solidFill>
                   <a:schemeClr val="dk1"/>
                 </a:solidFill>
@@ -15448,22 +15384,10 @@
                 <a:cs typeface="Arial"/>
                 <a:sym typeface="Arial"/>
               </a:rPr>
-              <a:t>La existencia de internet 2.0 ha permitido que sean los usuarios quienes exigen a las compañías qué tipo de experiencia quieren vivir, y luego son ellos mismos quienes plasman y viralizan en la web dichas experiencias generando muchísima exposición a los proveedores, quienes pueden ver crecer o destruir su negocio en base a dichas viralizaciones. </a:t>
+              <a:t>The existence of Internet 2.0 has allowed users to demand from companies what kind of experience they want to live, and then it is they themselves who capture and </a:t>
             </a:r>
-            <a:endParaRPr/>
-          </a:p>
-          <a:p>
-            <a:pPr marL="0" marR="0" lvl="0" indent="0" algn="just" rtl="0">
-              <a:spcBef>
-                <a:spcPts val="1200"/>
-              </a:spcBef>
-              <a:spcAft>
-                <a:spcPts val="0"/>
-              </a:spcAft>
-              <a:buNone/>
-            </a:pPr>
             <a:r>
-              <a:rPr lang="en-US" sz="2000">
+              <a:rPr lang="en-US" sz="2000" dirty="0" err="1">
                 <a:solidFill>
                   <a:schemeClr val="dk1"/>
                 </a:solidFill>
@@ -15472,41 +15396,123 @@
                 <a:cs typeface="Arial"/>
                 <a:sym typeface="Arial"/>
               </a:rPr>
-              <a:t>Es por ello que, en la actualidad, para gestionar bien los negocios, es clave el buen uso de todas las herramientas posibles en la identificación del nivel de CX y detección de potenciales espacios de mejoras a través de lo publicado por los usuarios. </a:t>
+              <a:t>viralize</a:t>
             </a:r>
-            <a:endParaRPr sz="1800">
-              <a:solidFill>
-                <a:schemeClr val="dk1"/>
-              </a:solidFill>
-              <a:latin typeface="Calibri"/>
-              <a:ea typeface="Calibri"/>
-              <a:cs typeface="Calibri"/>
-              <a:sym typeface="Calibri"/>
-            </a:endParaRPr>
-          </a:p>
-          <a:p>
-            <a:pPr marL="0" marR="0" lvl="0" indent="0" algn="just" rtl="0">
-              <a:spcBef>
-                <a:spcPts val="1200"/>
-              </a:spcBef>
-              <a:spcAft>
-                <a:spcPts val="0"/>
-              </a:spcAft>
-              <a:buNone/>
-            </a:pPr>
             <a:r>
-              <a:rPr lang="en-US" sz="2000">
+              <a:rPr lang="en-US" sz="2000" dirty="0">
                 <a:solidFill>
-                  <a:schemeClr val="dk2"/>
+                  <a:schemeClr val="dk1"/>
                 </a:solidFill>
                 <a:latin typeface="Arial"/>
                 <a:ea typeface="Arial"/>
                 <a:cs typeface="Arial"/>
                 <a:sym typeface="Arial"/>
               </a:rPr>
-              <a:t>El objetivo del análisis consistió en analizar las reseñas obtenidas a través de TripAdvisor, para poder dotar de herramientas para el diseño e implementación de una estrategia de negocio orientada a mejorar el CX, que permitan construir ventajas competitivas.</a:t>
+              <a:t> these experiences on the web, generating a lot of exposure to providers, who can see them grow or destroy your business based on these </a:t>
             </a:r>
-            <a:endParaRPr/>
+            <a:r>
+              <a:rPr lang="en-US" sz="2000" dirty="0" err="1">
+                <a:solidFill>
+                  <a:schemeClr val="dk1"/>
+                </a:solidFill>
+                <a:latin typeface="Arial"/>
+                <a:ea typeface="Arial"/>
+                <a:cs typeface="Arial"/>
+                <a:sym typeface="Arial"/>
+              </a:rPr>
+              <a:t>viralizations</a:t>
+            </a:r>
+            <a:r>
+              <a:rPr lang="en-US" sz="2000" dirty="0">
+                <a:solidFill>
+                  <a:schemeClr val="dk1"/>
+                </a:solidFill>
+                <a:latin typeface="Arial"/>
+                <a:ea typeface="Arial"/>
+                <a:cs typeface="Arial"/>
+                <a:sym typeface="Arial"/>
+              </a:rPr>
+              <a:t>.</a:t>
+            </a:r>
+          </a:p>
+          <a:p>
+            <a:pPr marL="0" marR="0" lvl="0" indent="0" algn="just" rtl="0">
+              <a:spcBef>
+                <a:spcPts val="0"/>
+              </a:spcBef>
+              <a:spcAft>
+                <a:spcPts val="0"/>
+              </a:spcAft>
+              <a:buNone/>
+            </a:pPr>
+            <a:endParaRPr lang="en-US" sz="2000" dirty="0">
+              <a:solidFill>
+                <a:schemeClr val="dk1"/>
+              </a:solidFill>
+            </a:endParaRPr>
+          </a:p>
+          <a:p>
+            <a:pPr marL="0" marR="0" lvl="0" indent="0" algn="just" rtl="0">
+              <a:spcBef>
+                <a:spcPts val="0"/>
+              </a:spcBef>
+              <a:spcAft>
+                <a:spcPts val="0"/>
+              </a:spcAft>
+              <a:buNone/>
+            </a:pPr>
+            <a:r>
+              <a:rPr lang="en-US" sz="2000" dirty="0">
+                <a:solidFill>
+                  <a:schemeClr val="dk1"/>
+                </a:solidFill>
+                <a:latin typeface="Arial"/>
+                <a:ea typeface="Arial"/>
+                <a:cs typeface="Arial"/>
+                <a:sym typeface="Arial"/>
+              </a:rPr>
+              <a:t>That is why, currently, in order to manage businesses well, it is essential to use all possible tools to identify the level of CX and detect potential areas for improvement through what is published by users.</a:t>
+            </a:r>
+          </a:p>
+          <a:p>
+            <a:pPr marL="0" marR="0" lvl="0" indent="0" algn="just" rtl="0">
+              <a:spcBef>
+                <a:spcPts val="0"/>
+              </a:spcBef>
+              <a:spcAft>
+                <a:spcPts val="0"/>
+              </a:spcAft>
+              <a:buNone/>
+            </a:pPr>
+            <a:endParaRPr lang="en-US" sz="2000" dirty="0">
+              <a:solidFill>
+                <a:schemeClr val="dk1"/>
+              </a:solidFill>
+            </a:endParaRPr>
+          </a:p>
+          <a:p>
+            <a:pPr marL="0" marR="0" lvl="0" indent="0" algn="just" rtl="0">
+              <a:spcBef>
+                <a:spcPts val="0"/>
+              </a:spcBef>
+              <a:spcAft>
+                <a:spcPts val="0"/>
+              </a:spcAft>
+              <a:buNone/>
+            </a:pPr>
+            <a:r>
+              <a:rPr lang="en-US" sz="2000" dirty="0">
+                <a:solidFill>
+                  <a:schemeClr val="dk1"/>
+                </a:solidFill>
+                <a:latin typeface="Arial"/>
+                <a:ea typeface="Arial"/>
+                <a:cs typeface="Arial"/>
+                <a:sym typeface="Arial"/>
+              </a:rPr>
+              <a:t>The objective of the analysis was to analyze the reviews obtained through TripAdvisor, in order to provide tools for the design and implementation of a business strategy aimed at improving CX, which allow building competitive advantages.</a:t>
+            </a:r>
+            <a:endParaRPr dirty="0"/>
           </a:p>
         </p:txBody>
       </p:sp>
@@ -16333,7 +16339,7 @@
         <p:spPr>
           <a:xfrm>
             <a:off x="320733" y="943159"/>
-            <a:ext cx="7902285" cy="4555093"/>
+            <a:ext cx="7902285" cy="4401164"/>
           </a:xfrm>
           <a:prstGeom prst="rect">
             <a:avLst/>
@@ -16364,7 +16370,7 @@
               <a:buAutoNum type="arabicPeriod"/>
             </a:pPr>
             <a:r>
-              <a:rPr lang="en-US" sz="2000">
+              <a:rPr lang="en-US" sz="2000" dirty="0">
                 <a:solidFill>
                   <a:schemeClr val="dk2"/>
                 </a:solidFill>
@@ -16373,9 +16379,9 @@
                 <a:cs typeface="Arial"/>
                 <a:sym typeface="Arial"/>
               </a:rPr>
-              <a:t>Carga del dataset.</a:t>
+              <a:t>Loading of the dataset..</a:t>
             </a:r>
-            <a:endParaRPr/>
+            <a:endParaRPr dirty="0"/>
           </a:p>
           <a:p>
             <a:pPr marL="457200" marR="0" lvl="0" indent="-457200" algn="just" rtl="0">
@@ -16393,7 +16399,7 @@
               <a:buAutoNum type="arabicPeriod"/>
             </a:pPr>
             <a:r>
-              <a:rPr lang="en-US" sz="2000">
+              <a:rPr lang="en-US" sz="2000" dirty="0">
                 <a:solidFill>
                   <a:schemeClr val="dk2"/>
                 </a:solidFill>
@@ -16402,9 +16408,9 @@
                 <a:cs typeface="Arial"/>
                 <a:sym typeface="Arial"/>
               </a:rPr>
-              <a:t>Creación de un nuevo target para clasificar por detractores y promotores.</a:t>
+              <a:t>Creation of a new target to classify by detractors and promoters.</a:t>
             </a:r>
-            <a:endParaRPr/>
+            <a:endParaRPr dirty="0"/>
           </a:p>
           <a:p>
             <a:pPr marL="457200" marR="0" lvl="0" indent="-457200" algn="just" rtl="0">
@@ -16422,7 +16428,7 @@
               <a:buAutoNum type="arabicPeriod"/>
             </a:pPr>
             <a:r>
-              <a:rPr lang="en-US" sz="2000">
+              <a:rPr lang="en-US" sz="2000" dirty="0">
                 <a:solidFill>
                   <a:schemeClr val="dk2"/>
                 </a:solidFill>
@@ -16431,9 +16437,9 @@
                 <a:cs typeface="Arial"/>
                 <a:sym typeface="Arial"/>
               </a:rPr>
-              <a:t>Separación entre:</a:t>
+              <a:t>Separation Between:</a:t>
             </a:r>
-            <a:endParaRPr/>
+            <a:endParaRPr dirty="0"/>
           </a:p>
           <a:p>
             <a:pPr marL="914400" marR="0" lvl="1" indent="-457200" algn="just" rtl="0">
@@ -16451,7 +16457,7 @@
               <a:buChar char="•"/>
             </a:pPr>
             <a:r>
-              <a:rPr lang="en-US" sz="1800" b="0" i="0" u="none" strike="noStrike" cap="none">
+              <a:rPr lang="en-US" sz="1800" b="0" i="0" u="none" strike="noStrike" cap="none" dirty="0">
                 <a:solidFill>
                   <a:schemeClr val="dk2"/>
                 </a:solidFill>
@@ -16460,9 +16466,9 @@
                 <a:cs typeface="Arial"/>
                 <a:sym typeface="Arial"/>
               </a:rPr>
-              <a:t>Detractores (rating  1, 2 y 3).</a:t>
+              <a:t>Detractors (rating  1, 2 &amp; 3).</a:t>
             </a:r>
-            <a:endParaRPr/>
+            <a:endParaRPr dirty="0"/>
           </a:p>
           <a:p>
             <a:pPr marL="914400" marR="0" lvl="1" indent="-457200" algn="just" rtl="0">
@@ -16480,7 +16486,7 @@
               <a:buChar char="•"/>
             </a:pPr>
             <a:r>
-              <a:rPr lang="en-US" sz="1800" b="0" i="0" u="none" strike="noStrike" cap="none">
+              <a:rPr lang="en-US" sz="1800" b="0" i="0" u="none" strike="noStrike" cap="none" dirty="0">
                 <a:solidFill>
                   <a:schemeClr val="dk2"/>
                 </a:solidFill>
@@ -16489,9 +16495,9 @@
                 <a:cs typeface="Arial"/>
                 <a:sym typeface="Arial"/>
               </a:rPr>
-              <a:t>Promotores (rating 5 y 4).</a:t>
+              <a:t>Promoters (rating 5 &amp; 4).</a:t>
             </a:r>
-            <a:endParaRPr/>
+            <a:endParaRPr dirty="0"/>
           </a:p>
           <a:p>
             <a:pPr marL="457200" marR="0" lvl="0" indent="-457200" algn="just" rtl="0">
@@ -16509,7 +16515,7 @@
               <a:buAutoNum type="arabicPeriod"/>
             </a:pPr>
             <a:r>
-              <a:rPr lang="en-US" sz="2000">
+              <a:rPr lang="en-US" sz="2000" dirty="0">
                 <a:solidFill>
                   <a:schemeClr val="dk2"/>
                 </a:solidFill>
@@ -16518,9 +16524,9 @@
                 <a:cs typeface="Arial"/>
                 <a:sym typeface="Arial"/>
               </a:rPr>
-              <a:t>Tokenización.</a:t>
+              <a:t>Tokenization.</a:t>
             </a:r>
-            <a:endParaRPr/>
+            <a:endParaRPr dirty="0"/>
           </a:p>
           <a:p>
             <a:pPr marL="457200" marR="0" lvl="0" indent="-457200" algn="just" rtl="0">
@@ -16538,7 +16544,7 @@
               <a:buAutoNum type="arabicPeriod"/>
             </a:pPr>
             <a:r>
-              <a:rPr lang="en-US" sz="2000">
+              <a:rPr lang="en-US" sz="2000" dirty="0">
                 <a:solidFill>
                   <a:schemeClr val="dk2"/>
                 </a:solidFill>
@@ -16547,9 +16553,9 @@
                 <a:cs typeface="Arial"/>
                 <a:sym typeface="Arial"/>
               </a:rPr>
-              <a:t>Limpieza del dataset:</a:t>
+              <a:t>Data cleaning:</a:t>
             </a:r>
-            <a:endParaRPr/>
+            <a:endParaRPr dirty="0"/>
           </a:p>
           <a:p>
             <a:pPr marL="914400" marR="0" lvl="1" indent="-457200" algn="just" rtl="0">
@@ -16567,7 +16573,7 @@
               <a:buAutoNum type="arabicPeriod"/>
             </a:pPr>
             <a:r>
-              <a:rPr lang="en-US" sz="1800" b="0" i="0" u="none" strike="noStrike" cap="none">
+              <a:rPr lang="en-US" sz="1800" b="0" i="0" u="none" strike="noStrike" cap="none" dirty="0">
                 <a:solidFill>
                   <a:schemeClr val="dk2"/>
                 </a:solidFill>
@@ -16578,7 +16584,7 @@
               </a:rPr>
               <a:t>Stopwords.</a:t>
             </a:r>
-            <a:endParaRPr/>
+            <a:endParaRPr dirty="0"/>
           </a:p>
           <a:p>
             <a:pPr marL="914400" marR="0" lvl="1" indent="-457200" algn="just" rtl="0">
@@ -16596,7 +16602,7 @@
               <a:buAutoNum type="arabicPeriod"/>
             </a:pPr>
             <a:r>
-              <a:rPr lang="en-US" sz="1800" b="0" i="0" u="none" strike="noStrike" cap="none">
+              <a:rPr lang="en-US" sz="1800" b="0" i="0" u="none" strike="noStrike" cap="none" dirty="0">
                 <a:solidFill>
                   <a:schemeClr val="dk2"/>
                 </a:solidFill>
@@ -16605,9 +16611,9 @@
                 <a:cs typeface="Arial"/>
                 <a:sym typeface="Arial"/>
               </a:rPr>
-              <a:t>Palabras no relevantes para el análisis.</a:t>
+              <a:t>Words not relevant to the analysis..</a:t>
             </a:r>
-            <a:endParaRPr/>
+            <a:endParaRPr dirty="0"/>
           </a:p>
           <a:p>
             <a:pPr marL="914400" marR="0" lvl="1" indent="-457200" algn="just" rtl="0">
@@ -16625,7 +16631,7 @@
               <a:buAutoNum type="arabicPeriod"/>
             </a:pPr>
             <a:r>
-              <a:rPr lang="en-US" sz="1800" b="0" i="0" u="none" strike="noStrike" cap="none">
+              <a:rPr lang="en-US" sz="1800" b="0" i="0" u="none" strike="noStrike" cap="none" dirty="0">
                 <a:solidFill>
                   <a:schemeClr val="dk2"/>
                 </a:solidFill>
@@ -16634,9 +16640,9 @@
                 <a:cs typeface="Arial"/>
                 <a:sym typeface="Arial"/>
               </a:rPr>
-              <a:t>Caracteres especiales (expresiones regulares).</a:t>
+              <a:t>Special characters (regular expressions).</a:t>
             </a:r>
-            <a:endParaRPr/>
+            <a:endParaRPr dirty="0"/>
           </a:p>
         </p:txBody>
       </p:sp>
@@ -16728,7 +16734,7 @@
         <p:spPr>
           <a:xfrm>
             <a:off x="346710" y="351907"/>
-            <a:ext cx="6724650" cy="523220"/>
+            <a:ext cx="6724650" cy="523180"/>
           </a:xfrm>
           <a:prstGeom prst="rect">
             <a:avLst/>
@@ -16754,18 +16760,17 @@
               <a:buNone/>
             </a:pPr>
             <a:r>
-              <a:rPr lang="en-US" sz="2800">
+              <a:rPr lang="en-US" sz="2800" dirty="0">
                 <a:solidFill>
                   <a:schemeClr val="dk1"/>
                 </a:solidFill>
                 <a:latin typeface="Aharoni"/>
-                <a:ea typeface="Aharoni"/>
                 <a:cs typeface="Aharoni"/>
                 <a:sym typeface="Aharoni"/>
               </a:rPr>
-              <a:t>Modelo de Clasificación</a:t>
+              <a:t>Classification Models</a:t>
             </a:r>
-            <a:endParaRPr/>
+            <a:endParaRPr dirty="0"/>
           </a:p>
         </p:txBody>
       </p:sp>
@@ -16778,7 +16783,7 @@
         <p:spPr>
           <a:xfrm>
             <a:off x="346710" y="2264638"/>
-            <a:ext cx="11253584" cy="2800767"/>
+            <a:ext cx="11253584" cy="2800726"/>
           </a:xfrm>
           <a:prstGeom prst="rect">
             <a:avLst/>
@@ -16809,7 +16814,7 @@
               <a:buAutoNum type="arabicPeriod"/>
             </a:pPr>
             <a:r>
-              <a:rPr lang="en-US" sz="2000">
+              <a:rPr lang="en-US" sz="2000" dirty="0">
                 <a:solidFill>
                   <a:schemeClr val="dk1"/>
                 </a:solidFill>
@@ -16818,9 +16823,9 @@
                 <a:cs typeface="Arial"/>
                 <a:sym typeface="Arial"/>
               </a:rPr>
-              <a:t>Identificación de las palabras más repetidas entre los promotores, que no estén dentro del grupo de detractores.</a:t>
+              <a:t>Identification of the most repeated words among the promoters, which are not within the group of detractors.</a:t>
             </a:r>
-            <a:endParaRPr sz="2000">
+            <a:endParaRPr sz="2000" dirty="0">
               <a:solidFill>
                 <a:schemeClr val="dk1"/>
               </a:solidFill>
@@ -16846,7 +16851,7 @@
               <a:buAutoNum type="arabicPeriod"/>
             </a:pPr>
             <a:r>
-              <a:rPr lang="en-US" sz="2000">
+              <a:rPr lang="en-US" sz="2000" dirty="0">
                 <a:solidFill>
                   <a:schemeClr val="dk1"/>
                 </a:solidFill>
@@ -16855,17 +16860,8 @@
                 <a:cs typeface="Arial"/>
                 <a:sym typeface="Arial"/>
               </a:rPr>
-              <a:t>Stemmer de resultados.</a:t>
+              <a:t>Stemmer of results.</a:t>
             </a:r>
-            <a:endParaRPr sz="2000">
-              <a:solidFill>
-                <a:schemeClr val="dk1"/>
-              </a:solidFill>
-              <a:latin typeface="Arial"/>
-              <a:ea typeface="Arial"/>
-              <a:cs typeface="Arial"/>
-              <a:sym typeface="Arial"/>
-            </a:endParaRPr>
           </a:p>
           <a:p>
             <a:pPr marL="342900" marR="0" lvl="0" indent="-342900" algn="just" rtl="0">
@@ -16883,7 +16879,7 @@
               <a:buAutoNum type="arabicPeriod"/>
             </a:pPr>
             <a:r>
-              <a:rPr lang="en-US" sz="2000">
+              <a:rPr lang="en-US" sz="2000" dirty="0">
                 <a:solidFill>
                   <a:schemeClr val="dk1"/>
                 </a:solidFill>
@@ -16892,27 +16888,10 @@
                 <a:cs typeface="Arial"/>
                 <a:sym typeface="Arial"/>
               </a:rPr>
-              <a:t>Selección de las 14.000 palabras más comunes para entrenar los modelos.</a:t>
+              <a:t>Selection of the features that best discriminate for each class</a:t>
             </a:r>
-            <a:endParaRPr/>
-          </a:p>
-          <a:p>
-            <a:pPr marL="342900" marR="0" lvl="0" indent="-342900" algn="just" rtl="0">
-              <a:spcBef>
-                <a:spcPts val="0"/>
-              </a:spcBef>
-              <a:spcAft>
-                <a:spcPts val="0"/>
-              </a:spcAft>
-              <a:buClr>
-                <a:schemeClr val="dk1"/>
-              </a:buClr>
-              <a:buSzPts val="2000"/>
-              <a:buFont typeface="Arial"/>
-              <a:buAutoNum type="arabicPeriod"/>
-            </a:pPr>
             <a:r>
-              <a:rPr lang="en-US" sz="2000">
+              <a:rPr lang="es-MX" sz="2000" dirty="0">
                 <a:solidFill>
                   <a:schemeClr val="dk1"/>
                 </a:solidFill>
@@ -16921,9 +16900,38 @@
                 <a:cs typeface="Arial"/>
                 <a:sym typeface="Arial"/>
               </a:rPr>
-              <a:t>Creación de múltiples modelos:</a:t>
+              <a:t>.</a:t>
             </a:r>
-            <a:endParaRPr sz="2000">
+            <a:endParaRPr lang="es-MX" dirty="0"/>
+          </a:p>
+          <a:p>
+            <a:pPr marL="342900" marR="0" lvl="0" indent="-342900" algn="just" rtl="0">
+              <a:spcBef>
+                <a:spcPts val="0"/>
+              </a:spcBef>
+              <a:spcAft>
+                <a:spcPts val="0"/>
+              </a:spcAft>
+              <a:buClr>
+                <a:schemeClr val="dk1"/>
+              </a:buClr>
+              <a:buSzPts val="2000"/>
+              <a:buFont typeface="Arial"/>
+              <a:buAutoNum type="arabicPeriod"/>
+            </a:pPr>
+            <a:r>
+              <a:rPr lang="en-US" sz="2000" dirty="0">
+                <a:solidFill>
+                  <a:schemeClr val="dk1"/>
+                </a:solidFill>
+                <a:latin typeface="Arial"/>
+                <a:ea typeface="Arial"/>
+                <a:cs typeface="Arial"/>
+                <a:sym typeface="Arial"/>
+              </a:rPr>
+              <a:t>Creation of multiple models:</a:t>
+            </a:r>
+            <a:endParaRPr sz="2000" dirty="0">
               <a:solidFill>
                 <a:schemeClr val="dk1"/>
               </a:solidFill>
@@ -16949,7 +16957,7 @@
               <a:buAutoNum type="arabicPeriod"/>
             </a:pPr>
             <a:r>
-              <a:rPr lang="en-US" sz="2000" b="0" i="0" u="none" strike="noStrike" cap="none">
+              <a:rPr lang="en-US" sz="2000" b="0" i="0" u="none" strike="noStrike" cap="none" dirty="0">
                 <a:solidFill>
                   <a:schemeClr val="dk1"/>
                 </a:solidFill>
@@ -16958,9 +16966,9 @@
                 <a:cs typeface="Arial"/>
                 <a:sym typeface="Arial"/>
               </a:rPr>
-              <a:t>Regresión Logística.</a:t>
+              <a:t>Logistic Regression.</a:t>
             </a:r>
-            <a:endParaRPr sz="2000" b="0" i="0" u="none" strike="noStrike" cap="none">
+            <a:endParaRPr sz="2000" b="0" i="0" u="none" strike="noStrike" cap="none" dirty="0">
               <a:solidFill>
                 <a:schemeClr val="dk1"/>
               </a:solidFill>
@@ -16986,7 +16994,7 @@
               <a:buAutoNum type="arabicPeriod"/>
             </a:pPr>
             <a:r>
-              <a:rPr lang="en-US" sz="2000" b="0" i="0" u="none" strike="noStrike" cap="none">
+              <a:rPr lang="en-US" sz="2000" b="0" i="0" u="none" strike="noStrike" cap="none" dirty="0">
                 <a:solidFill>
                   <a:schemeClr val="dk1"/>
                 </a:solidFill>
@@ -16997,7 +17005,7 @@
               </a:rPr>
               <a:t>SVM.</a:t>
             </a:r>
-            <a:endParaRPr sz="2000" b="0" i="0" u="none" strike="noStrike" cap="none">
+            <a:endParaRPr sz="2000" b="0" i="0" u="none" strike="noStrike" cap="none" dirty="0">
               <a:solidFill>
                 <a:schemeClr val="dk1"/>
               </a:solidFill>
@@ -17023,7 +17031,7 @@
               <a:buAutoNum type="arabicPeriod"/>
             </a:pPr>
             <a:r>
-              <a:rPr lang="en-US" sz="2000" b="0" i="0" u="none" strike="noStrike" cap="none">
+              <a:rPr lang="en-US" sz="2000" b="0" i="0" u="none" strike="noStrike" cap="none" dirty="0" err="1">
                 <a:solidFill>
                   <a:schemeClr val="dk1"/>
                 </a:solidFill>
@@ -17032,9 +17040,21 @@
                 <a:cs typeface="Arial"/>
                 <a:sym typeface="Arial"/>
               </a:rPr>
-              <a:t>LightGBM.</a:t>
+              <a:t>LightGBM</a:t>
             </a:r>
-            <a:endParaRPr sz="1600" b="0" i="0" u="none" strike="noStrike" cap="none">
+            <a:r>
+              <a:rPr lang="en-US" sz="2000" b="0" i="0" u="none" strike="noStrike" cap="none" dirty="0">
+                <a:solidFill>
+                  <a:schemeClr val="dk1"/>
+                </a:solidFill>
+                <a:latin typeface="Arial"/>
+                <a:ea typeface="Arial"/>
+                <a:cs typeface="Arial"/>
+                <a:sym typeface="Arial"/>
+              </a:rPr>
+              <a:t>.</a:t>
+            </a:r>
+            <a:endParaRPr sz="1600" b="0" i="0" u="none" strike="noStrike" cap="none" dirty="0">
               <a:solidFill>
                 <a:schemeClr val="dk1"/>
               </a:solidFill>
@@ -17059,7 +17079,7 @@
               <a:buFont typeface="Calibri"/>
               <a:buNone/>
             </a:pPr>
-            <a:endParaRPr sz="1600">
+            <a:endParaRPr sz="1600" dirty="0">
               <a:solidFill>
                 <a:schemeClr val="dk1"/>
               </a:solidFill>
@@ -17110,7 +17130,7 @@
               <a:buNone/>
             </a:pPr>
             <a:r>
-              <a:rPr lang="en-US" sz="1800" b="1">
+              <a:rPr lang="en-US" sz="1800" b="1" dirty="0">
                 <a:solidFill>
                   <a:srgbClr val="000000"/>
                 </a:solidFill>
@@ -17119,9 +17139,9 @@
                 <a:cs typeface="Arial"/>
                 <a:sym typeface="Arial"/>
               </a:rPr>
-              <a:t>Principales problemas observados/encontrados: </a:t>
+              <a:t>Main problems observed/encountered:</a:t>
             </a:r>
-            <a:endParaRPr sz="1800">
+            <a:endParaRPr sz="1800" dirty="0">
               <a:solidFill>
                 <a:srgbClr val="000000"/>
               </a:solidFill>
@@ -17147,7 +17167,7 @@
               <a:buChar char="•"/>
             </a:pPr>
             <a:r>
-              <a:rPr lang="en-US" sz="1800">
+              <a:rPr lang="en-US" sz="1800" dirty="0">
                 <a:solidFill>
                   <a:srgbClr val="000000"/>
                 </a:solidFill>
@@ -17156,17 +17176,8 @@
                 <a:cs typeface="Arial"/>
                 <a:sym typeface="Arial"/>
               </a:rPr>
-              <a:t>Imposibilidad de identificar comentarios neutros ya que eran muy similares a los negativos</a:t>
+              <a:t>Inability to identify neutral comments as they were very similar to the negative ones.</a:t>
             </a:r>
-            <a:endParaRPr sz="1800">
-              <a:solidFill>
-                <a:srgbClr val="000000"/>
-              </a:solidFill>
-              <a:latin typeface="Arial"/>
-              <a:ea typeface="Arial"/>
-              <a:cs typeface="Arial"/>
-              <a:sym typeface="Arial"/>
-            </a:endParaRPr>
           </a:p>
           <a:p>
             <a:pPr marL="285750" marR="0" lvl="0" indent="-285750" algn="l" rtl="0">
@@ -17184,7 +17195,7 @@
               <a:buChar char="•"/>
             </a:pPr>
             <a:r>
-              <a:rPr lang="en-US" sz="1800">
+              <a:rPr lang="en-US" sz="1800" dirty="0">
                 <a:solidFill>
                   <a:srgbClr val="000000"/>
                 </a:solidFill>
@@ -17193,9 +17204,9 @@
                 <a:cs typeface="Arial"/>
                 <a:sym typeface="Arial"/>
               </a:rPr>
-              <a:t>Un dataset de entrenamiento con más columnas que observaciones</a:t>
+              <a:t>A training dataset with more columns than observations.</a:t>
             </a:r>
-            <a:endParaRPr sz="1800">
+            <a:endParaRPr sz="1800" dirty="0">
               <a:solidFill>
                 <a:srgbClr val="000000"/>
               </a:solidFill>
@@ -17279,7 +17290,7 @@
               <a:buNone/>
             </a:pPr>
             <a:r>
-              <a:rPr lang="en-US" sz="1800" b="1" u="sng">
+              <a:rPr lang="en-US" sz="1800" b="1" u="sng" dirty="0">
                 <a:solidFill>
                   <a:srgbClr val="000000"/>
                 </a:solidFill>
@@ -17288,9 +17299,9 @@
                 <a:cs typeface="Calibri"/>
                 <a:sym typeface="Calibri"/>
               </a:rPr>
-              <a:t>Motivación</a:t>
+              <a:t>Motivation</a:t>
             </a:r>
-            <a:endParaRPr sz="1800">
+            <a:endParaRPr sz="1800" dirty="0">
               <a:solidFill>
                 <a:srgbClr val="000000"/>
               </a:solidFill>
@@ -17311,7 +17322,7 @@
               <a:buNone/>
             </a:pPr>
             <a:r>
-              <a:rPr lang="en-US" sz="1800" i="1">
+              <a:rPr lang="en-US" sz="1800" i="1" dirty="0">
                 <a:solidFill>
                   <a:srgbClr val="000000"/>
                 </a:solidFill>
@@ -17320,9 +17331,9 @@
                 <a:cs typeface="Calibri"/>
                 <a:sym typeface="Calibri"/>
               </a:rPr>
-              <a:t>Medición de la experiencia del cliente durante su estadía en el hotel.</a:t>
+              <a:t>Measurement of the customer experience during their stay at the hotel.</a:t>
             </a:r>
-            <a:endParaRPr/>
+            <a:endParaRPr dirty="0"/>
           </a:p>
           <a:p>
             <a:pPr marL="0" marR="0" lvl="0" indent="0" algn="l" rtl="0">
@@ -17335,7 +17346,7 @@
               <a:buNone/>
             </a:pPr>
             <a:r>
-              <a:rPr lang="en-US" sz="1800" i="1">
+              <a:rPr lang="en-US" sz="1800" i="1" dirty="0">
                 <a:solidFill>
                   <a:srgbClr val="000000"/>
                 </a:solidFill>
@@ -17344,9 +17355,9 @@
                 <a:cs typeface="Calibri"/>
                 <a:sym typeface="Calibri"/>
               </a:rPr>
-              <a:t>Prescindir de la calificación para identificar experiencias positivas o negativas.</a:t>
+              <a:t>Do without rating to identify positive or negative experiences.</a:t>
             </a:r>
-            <a:endParaRPr sz="1800" i="1">
+            <a:endParaRPr sz="1800" i="1" dirty="0">
               <a:solidFill>
                 <a:srgbClr val="000000"/>
               </a:solidFill>
@@ -17445,7 +17456,7 @@
               <a:buNone/>
             </a:pPr>
             <a:r>
-              <a:rPr lang="en-US" sz="2800">
+              <a:rPr lang="en-US" sz="2800" dirty="0">
                 <a:solidFill>
                   <a:schemeClr val="dk1"/>
                 </a:solidFill>
@@ -17454,9 +17465,9 @@
                 <a:cs typeface="Aharoni"/>
                 <a:sym typeface="Aharoni"/>
               </a:rPr>
-              <a:t>Modelo de Clasificación - Resultados Obtenidos</a:t>
+              <a:t>Classification Models - Results</a:t>
             </a:r>
-            <a:endParaRPr sz="2800">
+            <a:endParaRPr sz="2800" dirty="0">
               <a:solidFill>
                 <a:schemeClr val="dk1"/>
               </a:solidFill>
@@ -17485,60 +17496,6 @@
           <a:xfrm>
             <a:off x="10584830" y="6218894"/>
             <a:ext cx="1606705" cy="637015"/>
-          </a:xfrm>
-          <a:prstGeom prst="rect">
-            <a:avLst/>
-          </a:prstGeom>
-          <a:noFill/>
-          <a:ln>
-            <a:noFill/>
-          </a:ln>
-        </p:spPr>
-      </p:pic>
-      <p:pic>
-        <p:nvPicPr>
-          <p:cNvPr id="147" name="Google Shape;147;p6"/>
-          <p:cNvPicPr preferRelativeResize="0"/>
-          <p:nvPr/>
-        </p:nvPicPr>
-        <p:blipFill rotWithShape="1">
-          <a:blip r:embed="rId5">
-            <a:alphaModFix/>
-          </a:blip>
-          <a:srcRect/>
-          <a:stretch/>
-        </p:blipFill>
-        <p:spPr>
-          <a:xfrm>
-            <a:off x="881062" y="1081360"/>
-            <a:ext cx="4057650" cy="1326623"/>
-          </a:xfrm>
-          <a:prstGeom prst="rect">
-            <a:avLst/>
-          </a:prstGeom>
-          <a:noFill/>
-          <a:ln>
-            <a:noFill/>
-          </a:ln>
-        </p:spPr>
-      </p:pic>
-      <p:pic>
-        <p:nvPicPr>
-          <p:cNvPr id="148" name="Google Shape;148;p6" descr="Chart, treemap chart&#10;&#10;Description automatically generated"/>
-          <p:cNvPicPr preferRelativeResize="0"/>
-          <p:nvPr/>
-        </p:nvPicPr>
-        <p:blipFill rotWithShape="1">
-          <a:blip r:embed="rId6">
-            <a:alphaModFix/>
-          </a:blip>
-          <a:srcRect/>
-          <a:stretch/>
-        </p:blipFill>
-        <p:spPr>
-          <a:xfrm>
-            <a:off x="5619750" y="799175"/>
-            <a:ext cx="2298968" cy="1957230"/>
           </a:xfrm>
           <a:prstGeom prst="rect">
             <a:avLst/>
@@ -17594,7 +17551,7 @@
               <a:buNone/>
             </a:pPr>
             <a:r>
-              <a:rPr lang="en-US" sz="1800" b="1" i="1">
+              <a:rPr lang="en-US" sz="1800" b="1" i="1" dirty="0">
                 <a:solidFill>
                   <a:srgbClr val="000000"/>
                 </a:solidFill>
@@ -17603,9 +17560,9 @@
                 <a:cs typeface="Arial"/>
                 <a:sym typeface="Arial"/>
               </a:rPr>
-              <a:t>Regresión Logística</a:t>
+              <a:t>Logistic Regression</a:t>
             </a:r>
-            <a:endParaRPr sz="1800" b="1" i="1">
+            <a:endParaRPr sz="1800" b="1" i="1" dirty="0">
               <a:solidFill>
                 <a:srgbClr val="000000"/>
               </a:solidFill>
@@ -17739,110 +17696,182 @@
       </p:sp>
       <p:pic>
         <p:nvPicPr>
-          <p:cNvPr id="152" name="Google Shape;152;p6" descr="Table&#10;&#10;Description automatically generated"/>
-          <p:cNvPicPr preferRelativeResize="0"/>
+          <p:cNvPr id="3" name="Imagen 2">
+            <a:extLst>
+              <a:ext uri="{FF2B5EF4-FFF2-40B4-BE49-F238E27FC236}">
+                <a16:creationId xmlns:a16="http://schemas.microsoft.com/office/drawing/2014/main" id="{A1769C1A-E620-4DF6-9A8B-E24A3AF15F1D}"/>
+              </a:ext>
+            </a:extLst>
+          </p:cNvPr>
+          <p:cNvPicPr>
+            <a:picLocks noChangeAspect="1"/>
+          </p:cNvPicPr>
           <p:nvPr/>
         </p:nvPicPr>
-        <p:blipFill rotWithShape="1">
-          <a:blip r:embed="rId7">
-            <a:alphaModFix/>
-          </a:blip>
-          <a:srcRect/>
-          <a:stretch/>
+        <p:blipFill>
+          <a:blip r:embed="rId5"/>
+          <a:stretch>
+            <a:fillRect/>
+          </a:stretch>
         </p:blipFill>
         <p:spPr>
           <a:xfrm>
-            <a:off x="914400" y="3055407"/>
-            <a:ext cx="4029075" cy="1408109"/>
+            <a:off x="1171573" y="1043310"/>
+            <a:ext cx="3913349" cy="1499408"/>
           </a:xfrm>
           <a:prstGeom prst="rect">
             <a:avLst/>
           </a:prstGeom>
-          <a:noFill/>
-          <a:ln>
-            <a:noFill/>
-          </a:ln>
         </p:spPr>
       </p:pic>
       <p:pic>
         <p:nvPicPr>
-          <p:cNvPr id="153" name="Google Shape;153;p6" descr="Chart, treemap chart&#10;&#10;Description automatically generated"/>
-          <p:cNvPicPr preferRelativeResize="0"/>
+          <p:cNvPr id="5" name="Imagen 4">
+            <a:extLst>
+              <a:ext uri="{FF2B5EF4-FFF2-40B4-BE49-F238E27FC236}">
+                <a16:creationId xmlns:a16="http://schemas.microsoft.com/office/drawing/2014/main" id="{051910F9-F6E2-486A-99DE-B1465BD9B4A0}"/>
+              </a:ext>
+            </a:extLst>
+          </p:cNvPr>
+          <p:cNvPicPr>
+            <a:picLocks noChangeAspect="1"/>
+          </p:cNvPicPr>
           <p:nvPr/>
         </p:nvPicPr>
-        <p:blipFill rotWithShape="1">
-          <a:blip r:embed="rId8">
-            <a:alphaModFix/>
-          </a:blip>
-          <a:srcRect/>
-          <a:stretch/>
+        <p:blipFill>
+          <a:blip r:embed="rId6"/>
+          <a:stretch>
+            <a:fillRect/>
+          </a:stretch>
         </p:blipFill>
         <p:spPr>
           <a:xfrm>
-            <a:off x="5619750" y="2849442"/>
-            <a:ext cx="2298968" cy="1954511"/>
+            <a:off x="5494022" y="830443"/>
+            <a:ext cx="2276476" cy="1914710"/>
           </a:xfrm>
           <a:prstGeom prst="rect">
             <a:avLst/>
           </a:prstGeom>
-          <a:noFill/>
-          <a:ln>
-            <a:noFill/>
-          </a:ln>
         </p:spPr>
       </p:pic>
       <p:pic>
         <p:nvPicPr>
-          <p:cNvPr id="154" name="Google Shape;154;p6" descr="Table&#10;&#10;Description automatically generated"/>
-          <p:cNvPicPr preferRelativeResize="0"/>
+          <p:cNvPr id="7" name="Imagen 6">
+            <a:extLst>
+              <a:ext uri="{FF2B5EF4-FFF2-40B4-BE49-F238E27FC236}">
+                <a16:creationId xmlns:a16="http://schemas.microsoft.com/office/drawing/2014/main" id="{7A366709-A562-4FEF-9125-7DC79C052AD9}"/>
+              </a:ext>
+            </a:extLst>
+          </p:cNvPr>
+          <p:cNvPicPr>
+            <a:picLocks noChangeAspect="1"/>
+          </p:cNvPicPr>
           <p:nvPr/>
         </p:nvPicPr>
-        <p:blipFill rotWithShape="1">
-          <a:blip r:embed="rId9">
-            <a:alphaModFix/>
-          </a:blip>
-          <a:srcRect/>
-          <a:stretch/>
+        <p:blipFill>
+          <a:blip r:embed="rId7"/>
+          <a:stretch>
+            <a:fillRect/>
+          </a:stretch>
         </p:blipFill>
         <p:spPr>
           <a:xfrm>
-            <a:off x="909637" y="4976205"/>
-            <a:ext cx="4029075" cy="1427875"/>
+            <a:off x="1171573" y="3067056"/>
+            <a:ext cx="3913349" cy="1522454"/>
           </a:xfrm>
           <a:prstGeom prst="rect">
             <a:avLst/>
           </a:prstGeom>
-          <a:noFill/>
-          <a:ln>
-            <a:noFill/>
-          </a:ln>
         </p:spPr>
       </p:pic>
       <p:pic>
         <p:nvPicPr>
-          <p:cNvPr id="155" name="Google Shape;155;p6" descr="Chart, treemap chart&#10;&#10;Description automatically generated"/>
-          <p:cNvPicPr preferRelativeResize="0"/>
+          <p:cNvPr id="9" name="Imagen 8">
+            <a:extLst>
+              <a:ext uri="{FF2B5EF4-FFF2-40B4-BE49-F238E27FC236}">
+                <a16:creationId xmlns:a16="http://schemas.microsoft.com/office/drawing/2014/main" id="{E1A92DD5-4D78-49F5-8B49-0EEC251DD978}"/>
+              </a:ext>
+            </a:extLst>
+          </p:cNvPr>
+          <p:cNvPicPr>
+            <a:picLocks noChangeAspect="1"/>
+          </p:cNvPicPr>
           <p:nvPr/>
         </p:nvPicPr>
-        <p:blipFill rotWithShape="1">
-          <a:blip r:embed="rId10">
-            <a:alphaModFix/>
-          </a:blip>
-          <a:srcRect/>
-          <a:stretch/>
+        <p:blipFill>
+          <a:blip r:embed="rId8"/>
+          <a:stretch>
+            <a:fillRect/>
+          </a:stretch>
         </p:blipFill>
         <p:spPr>
           <a:xfrm>
-            <a:off x="5619750" y="4903777"/>
-            <a:ext cx="2298968" cy="1958575"/>
+            <a:off x="5503548" y="2899645"/>
+            <a:ext cx="2266950" cy="1896476"/>
           </a:xfrm>
           <a:prstGeom prst="rect">
             <a:avLst/>
           </a:prstGeom>
-          <a:noFill/>
-          <a:ln>
-            <a:noFill/>
-          </a:ln>
+        </p:spPr>
+      </p:pic>
+      <p:pic>
+        <p:nvPicPr>
+          <p:cNvPr id="11" name="Imagen 10">
+            <a:extLst>
+              <a:ext uri="{FF2B5EF4-FFF2-40B4-BE49-F238E27FC236}">
+                <a16:creationId xmlns:a16="http://schemas.microsoft.com/office/drawing/2014/main" id="{0641BC93-1038-41C1-9FBA-B213E654905A}"/>
+              </a:ext>
+            </a:extLst>
+          </p:cNvPr>
+          <p:cNvPicPr>
+            <a:picLocks noChangeAspect="1"/>
+          </p:cNvPicPr>
+          <p:nvPr/>
+        </p:nvPicPr>
+        <p:blipFill>
+          <a:blip r:embed="rId9"/>
+          <a:stretch>
+            <a:fillRect/>
+          </a:stretch>
+        </p:blipFill>
+        <p:spPr>
+          <a:xfrm>
+            <a:off x="1171573" y="5096281"/>
+            <a:ext cx="3913349" cy="1539323"/>
+          </a:xfrm>
+          <a:prstGeom prst="rect">
+            <a:avLst/>
+          </a:prstGeom>
+        </p:spPr>
+      </p:pic>
+      <p:pic>
+        <p:nvPicPr>
+          <p:cNvPr id="13" name="Imagen 12">
+            <a:extLst>
+              <a:ext uri="{FF2B5EF4-FFF2-40B4-BE49-F238E27FC236}">
+                <a16:creationId xmlns:a16="http://schemas.microsoft.com/office/drawing/2014/main" id="{2E1DA9E5-4138-4824-92E0-AB69295DA8EA}"/>
+              </a:ext>
+            </a:extLst>
+          </p:cNvPr>
+          <p:cNvPicPr>
+            <a:picLocks noChangeAspect="1"/>
+          </p:cNvPicPr>
+          <p:nvPr/>
+        </p:nvPicPr>
+        <p:blipFill>
+          <a:blip r:embed="rId10"/>
+          <a:stretch>
+            <a:fillRect/>
+          </a:stretch>
+        </p:blipFill>
+        <p:spPr>
+          <a:xfrm>
+            <a:off x="5503548" y="4950613"/>
+            <a:ext cx="2266950" cy="1905296"/>
+          </a:xfrm>
+          <a:prstGeom prst="rect">
+            <a:avLst/>
+          </a:prstGeom>
         </p:spPr>
       </p:pic>
     </p:spTree>
@@ -17932,7 +17961,7 @@
               <a:buNone/>
             </a:pPr>
             <a:r>
-              <a:rPr lang="en-US" sz="2800">
+              <a:rPr lang="en-US" sz="2800" dirty="0">
                 <a:solidFill>
                   <a:schemeClr val="dk1"/>
                 </a:solidFill>
@@ -17941,9 +17970,9 @@
                 <a:cs typeface="Aharoni"/>
                 <a:sym typeface="Aharoni"/>
               </a:rPr>
-              <a:t>Análisis de Tópicos</a:t>
+              <a:t>Topic Analysis</a:t>
             </a:r>
-            <a:endParaRPr/>
+            <a:endParaRPr dirty="0"/>
           </a:p>
         </p:txBody>
       </p:sp>
@@ -18019,7 +18048,7 @@
               <a:buNone/>
             </a:pPr>
             <a:r>
-              <a:rPr lang="en-US" sz="1800" b="1" u="sng">
+              <a:rPr lang="en-US" sz="1800" b="1" u="sng" dirty="0">
                 <a:solidFill>
                   <a:srgbClr val="000000"/>
                 </a:solidFill>
@@ -18028,9 +18057,9 @@
                 <a:cs typeface="Calibri"/>
                 <a:sym typeface="Calibri"/>
               </a:rPr>
-              <a:t>Motivación</a:t>
+              <a:t>Motivation</a:t>
             </a:r>
-            <a:endParaRPr/>
+            <a:endParaRPr dirty="0"/>
           </a:p>
           <a:p>
             <a:pPr marL="0" marR="0" lvl="0" indent="0" algn="l" rtl="0">
@@ -18043,7 +18072,7 @@
               <a:buNone/>
             </a:pPr>
             <a:r>
-              <a:rPr lang="en-US" sz="1800">
+              <a:rPr lang="en-US" sz="1800" dirty="0">
                 <a:solidFill>
                   <a:srgbClr val="000000"/>
                 </a:solidFill>
@@ -18052,9 +18081,9 @@
                 <a:cs typeface="Calibri"/>
                 <a:sym typeface="Calibri"/>
               </a:rPr>
-              <a:t>Identificar los aspectos principales vistos por los huéspedes como negativos y positivos.</a:t>
+              <a:t>Identify the main aspects seen by guests as negative and positive.</a:t>
             </a:r>
-            <a:endParaRPr/>
+            <a:endParaRPr dirty="0"/>
           </a:p>
         </p:txBody>
       </p:sp>
@@ -18067,7 +18096,7 @@
         <p:spPr>
           <a:xfrm>
             <a:off x="346710" y="2264638"/>
-            <a:ext cx="11253584" cy="2492990"/>
+            <a:ext cx="11253584" cy="2246729"/>
           </a:xfrm>
           <a:prstGeom prst="rect">
             <a:avLst/>
@@ -18098,7 +18127,7 @@
               <a:buAutoNum type="arabicPeriod"/>
             </a:pPr>
             <a:r>
-              <a:rPr lang="en-US" sz="2000">
+              <a:rPr lang="en-US" sz="2000" dirty="0">
                 <a:solidFill>
                   <a:schemeClr val="dk1"/>
                 </a:solidFill>
@@ -18107,9 +18136,9 @@
                 <a:cs typeface="Arial"/>
                 <a:sym typeface="Arial"/>
               </a:rPr>
-              <a:t>Creación de Bigramas.</a:t>
+              <a:t>Bigrams creation.</a:t>
             </a:r>
-            <a:endParaRPr/>
+            <a:endParaRPr dirty="0"/>
           </a:p>
           <a:p>
             <a:pPr marL="342900" marR="0" lvl="0" indent="-342900" algn="just" rtl="0">
@@ -18127,7 +18156,7 @@
               <a:buAutoNum type="arabicPeriod"/>
             </a:pPr>
             <a:r>
-              <a:rPr lang="en-US" sz="2000">
+              <a:rPr lang="en-US" sz="2000" dirty="0">
                 <a:solidFill>
                   <a:schemeClr val="dk1"/>
                 </a:solidFill>
@@ -18136,9 +18165,9 @@
                 <a:cs typeface="Arial"/>
                 <a:sym typeface="Arial"/>
               </a:rPr>
-              <a:t>Lemmatización.</a:t>
+              <a:t>Lemmatization.</a:t>
             </a:r>
-            <a:endParaRPr/>
+            <a:endParaRPr dirty="0"/>
           </a:p>
           <a:p>
             <a:pPr marL="342900" marR="0" lvl="0" indent="-342900" algn="just" rtl="0">
@@ -18156,7 +18185,7 @@
               <a:buAutoNum type="arabicPeriod"/>
             </a:pPr>
             <a:r>
-              <a:rPr lang="en-US" sz="2000">
+              <a:rPr lang="en-US" sz="2000" dirty="0">
                 <a:solidFill>
                   <a:schemeClr val="dk1"/>
                 </a:solidFill>
@@ -18165,9 +18194,9 @@
                 <a:cs typeface="Arial"/>
                 <a:sym typeface="Arial"/>
               </a:rPr>
-              <a:t>Creación del modelo Latent Dirichlet Allocation (LDA) para detractores y promotores por separado.</a:t>
+              <a:t>Creation of the Latent Dirichlet Allocation (LDA) model for detractors and promoters separately.</a:t>
             </a:r>
-            <a:endParaRPr sz="2000">
+            <a:endParaRPr sz="2000" dirty="0">
               <a:solidFill>
                 <a:schemeClr val="dk1"/>
               </a:solidFill>
@@ -18193,7 +18222,7 @@
               <a:buAutoNum type="arabicPeriod"/>
             </a:pPr>
             <a:r>
-              <a:rPr lang="en-US" sz="2000">
+              <a:rPr lang="en-US" sz="2000" dirty="0">
                 <a:solidFill>
                   <a:schemeClr val="dk1"/>
                 </a:solidFill>
@@ -18202,9 +18231,9 @@
                 <a:cs typeface="Arial"/>
                 <a:sym typeface="Arial"/>
               </a:rPr>
-              <a:t>Identificación de la cantidad óptima de tópicos para cada modelo.</a:t>
+              <a:t>Identification of the optimal number of topics for each model.</a:t>
             </a:r>
-            <a:endParaRPr sz="2000">
+            <a:endParaRPr sz="2000" dirty="0">
               <a:solidFill>
                 <a:schemeClr val="dk1"/>
               </a:solidFill>
@@ -18230,7 +18259,7 @@
               <a:buAutoNum type="arabicPeriod"/>
             </a:pPr>
             <a:r>
-              <a:rPr lang="en-US" sz="2000">
+              <a:rPr lang="en-US" sz="2000" dirty="0">
                 <a:solidFill>
                   <a:schemeClr val="dk1"/>
                 </a:solidFill>
@@ -18239,9 +18268,9 @@
                 <a:cs typeface="Arial"/>
                 <a:sym typeface="Arial"/>
               </a:rPr>
-              <a:t>Identificación del tópico relevante para cada registro.</a:t>
+              <a:t>Identification of the relevant topic for each record.</a:t>
             </a:r>
-            <a:endParaRPr sz="2000">
+            <a:endParaRPr sz="2000" dirty="0">
               <a:solidFill>
                 <a:schemeClr val="dk1"/>
               </a:solidFill>
@@ -18267,7 +18296,7 @@
               <a:buAutoNum type="arabicPeriod"/>
             </a:pPr>
             <a:r>
-              <a:rPr lang="en-US" sz="2000">
+              <a:rPr lang="en-US" sz="2000" dirty="0">
                 <a:solidFill>
                   <a:schemeClr val="dk1"/>
                 </a:solidFill>
@@ -18276,17 +18305,8 @@
                 <a:cs typeface="Arial"/>
                 <a:sym typeface="Arial"/>
               </a:rPr>
-              <a:t>Identificación del registro más representativo para cada tópico.</a:t>
+              <a:t>Identification of the most representative record for each topic.</a:t>
             </a:r>
-            <a:endParaRPr sz="2000">
-              <a:solidFill>
-                <a:schemeClr val="dk1"/>
-              </a:solidFill>
-              <a:latin typeface="Arial"/>
-              <a:ea typeface="Arial"/>
-              <a:cs typeface="Arial"/>
-              <a:sym typeface="Arial"/>
-            </a:endParaRPr>
           </a:p>
           <a:p>
             <a:pPr marL="342900" marR="0" lvl="0" indent="-342900" algn="just" rtl="0">
@@ -18304,7 +18324,7 @@
               <a:buAutoNum type="arabicPeriod"/>
             </a:pPr>
             <a:r>
-              <a:rPr lang="en-US" sz="2000">
+              <a:rPr lang="en-US" sz="2000" dirty="0">
                 <a:solidFill>
                   <a:schemeClr val="dk1"/>
                 </a:solidFill>
@@ -18313,34 +18333,9 @@
                 <a:cs typeface="Arial"/>
                 <a:sym typeface="Arial"/>
               </a:rPr>
-              <a:t>Obtención de la distribución de los tópicos en el dataset.</a:t>
+              <a:t>Obtaining the distribution of the topics in the dataset.</a:t>
             </a:r>
-            <a:endParaRPr sz="2000">
-              <a:solidFill>
-                <a:schemeClr val="dk1"/>
-              </a:solidFill>
-              <a:latin typeface="Arial"/>
-              <a:ea typeface="Arial"/>
-              <a:cs typeface="Arial"/>
-              <a:sym typeface="Arial"/>
-            </a:endParaRPr>
-          </a:p>
-          <a:p>
-            <a:pPr marL="342900" marR="0" lvl="0" indent="-241300" algn="just" rtl="0">
-              <a:spcBef>
-                <a:spcPts val="0"/>
-              </a:spcBef>
-              <a:spcAft>
-                <a:spcPts val="0"/>
-              </a:spcAft>
-              <a:buClr>
-                <a:schemeClr val="dk1"/>
-              </a:buClr>
-              <a:buSzPts val="1600"/>
-              <a:buFont typeface="Calibri"/>
-              <a:buNone/>
-            </a:pPr>
-            <a:endParaRPr sz="1600">
+            <a:endParaRPr sz="1600" dirty="0">
               <a:solidFill>
                 <a:schemeClr val="dk1"/>
               </a:solidFill>
@@ -18360,8 +18355,8 @@
         </p:nvSpPr>
         <p:spPr>
           <a:xfrm>
-            <a:off x="363106" y="5351044"/>
-            <a:ext cx="11253584" cy="1021182"/>
+            <a:off x="363106" y="5065405"/>
+            <a:ext cx="11253584" cy="1306821"/>
           </a:xfrm>
           <a:prstGeom prst="roundRect">
             <a:avLst>
@@ -18391,7 +18386,7 @@
               <a:buNone/>
             </a:pPr>
             <a:r>
-              <a:rPr lang="en-US" sz="1800" b="1">
+              <a:rPr lang="en-US" sz="1800" b="1" dirty="0">
                 <a:solidFill>
                   <a:srgbClr val="000000"/>
                 </a:solidFill>
@@ -18400,9 +18395,21 @@
                 <a:cs typeface="Arial"/>
                 <a:sym typeface="Arial"/>
               </a:rPr>
-              <a:t>Principales problemas observados/encontrados: </a:t>
+              <a:t>Main problems observed/encountered </a:t>
             </a:r>
-            <a:endParaRPr/>
+            <a:r>
+              <a:rPr lang="es-MX" sz="1800" b="1" dirty="0">
+                <a:solidFill>
+                  <a:srgbClr val="000000"/>
+                </a:solidFill>
+                <a:latin typeface="Arial"/>
+                <a:ea typeface="Arial"/>
+                <a:cs typeface="Arial"/>
+                <a:sym typeface="Arial"/>
+              </a:rPr>
+              <a:t>: </a:t>
+            </a:r>
+            <a:endParaRPr lang="es-MX" dirty="0"/>
           </a:p>
           <a:p>
             <a:pPr marL="285750" marR="0" lvl="0" indent="-285750" algn="l" rtl="0">
@@ -18420,7 +18427,7 @@
               <a:buChar char="•"/>
             </a:pPr>
             <a:r>
-              <a:rPr lang="en-US" sz="1800">
+              <a:rPr lang="en-US" sz="1800" dirty="0">
                 <a:solidFill>
                   <a:srgbClr val="000000"/>
                 </a:solidFill>
@@ -18429,9 +18436,21 @@
                 <a:cs typeface="Arial"/>
                 <a:sym typeface="Arial"/>
               </a:rPr>
-              <a:t>Al aumentar la cantidad de tópicos se observa solapamiento entre ellos y tópicos con muy pocas palabras.</a:t>
+              <a:t>As the number of topics increases, overlapping is observed between them and topics with very few words</a:t>
             </a:r>
-            <a:endParaRPr/>
+            <a:r>
+              <a:rPr lang="es-MX" sz="1800" dirty="0">
+                <a:solidFill>
+                  <a:srgbClr val="000000"/>
+                </a:solidFill>
+                <a:latin typeface="Arial"/>
+                <a:ea typeface="Arial"/>
+                <a:cs typeface="Arial"/>
+                <a:sym typeface="Arial"/>
+              </a:rPr>
+              <a:t>.</a:t>
+            </a:r>
+            <a:endParaRPr lang="es-MX" dirty="0"/>
           </a:p>
           <a:p>
             <a:pPr marL="285750" marR="0" lvl="0" indent="-285750" algn="l" rtl="0">
@@ -18449,7 +18468,7 @@
               <a:buChar char="•"/>
             </a:pPr>
             <a:r>
-              <a:rPr lang="en-US" sz="1800">
+              <a:rPr lang="en-US" sz="1800" dirty="0">
                 <a:solidFill>
                   <a:srgbClr val="000000"/>
                 </a:solidFill>
@@ -18458,9 +18477,9 @@
                 <a:cs typeface="Arial"/>
                 <a:sym typeface="Arial"/>
               </a:rPr>
-              <a:t>Las palabras clave para la clasificación son ruido para el análisis de tópicos.</a:t>
+              <a:t>Keywords for classification are noise for topical analysis.</a:t>
             </a:r>
-            <a:endParaRPr/>
+            <a:endParaRPr dirty="0"/>
           </a:p>
         </p:txBody>
       </p:sp>
@@ -18551,7 +18570,7 @@
               <a:buNone/>
             </a:pPr>
             <a:r>
-              <a:rPr lang="en-US" sz="2800">
+              <a:rPr lang="en-US" sz="2800" dirty="0">
                 <a:solidFill>
                   <a:schemeClr val="dk1"/>
                 </a:solidFill>
@@ -18560,9 +18579,9 @@
                 <a:cs typeface="Aharoni"/>
                 <a:sym typeface="Aharoni"/>
               </a:rPr>
-              <a:t>Análisis de Tópicos - Resultados Obtenidos</a:t>
+              <a:t>Topic Analysis - Results</a:t>
             </a:r>
-            <a:endParaRPr/>
+            <a:endParaRPr dirty="0"/>
           </a:p>
           <a:p>
             <a:pPr marL="0" marR="0" lvl="0" indent="0" algn="l" rtl="0">
@@ -18575,7 +18594,7 @@
               <a:buNone/>
             </a:pPr>
             <a:r>
-              <a:rPr lang="en-US" sz="2400" b="1" i="1">
+              <a:rPr lang="en-US" sz="2400" b="1" i="1" dirty="0">
                 <a:solidFill>
                   <a:srgbClr val="FF0000"/>
                 </a:solidFill>
@@ -18584,9 +18603,9 @@
                 <a:cs typeface="Aharoni"/>
                 <a:sym typeface="Aharoni"/>
               </a:rPr>
-              <a:t>Detractores</a:t>
+              <a:t>Detractors</a:t>
             </a:r>
-            <a:endParaRPr sz="2400" b="1" i="1">
+            <a:endParaRPr sz="2400" b="1" i="1" dirty="0">
               <a:solidFill>
                 <a:srgbClr val="FF0000"/>
               </a:solidFill>
@@ -18799,18 +18818,6 @@
               <a:buNone/>
             </a:pPr>
             <a:r>
-              <a:rPr lang="en-US" sz="2800" dirty="0" err="1">
-                <a:solidFill>
-                  <a:schemeClr val="dk1"/>
-                </a:solidFill>
-                <a:latin typeface="Aharoni"/>
-                <a:ea typeface="Aharoni"/>
-                <a:cs typeface="Aharoni"/>
-                <a:sym typeface="Aharoni"/>
-              </a:rPr>
-              <a:t>Análisis</a:t>
-            </a:r>
-            <a:r>
               <a:rPr lang="en-US" sz="2800" dirty="0">
                 <a:solidFill>
                   <a:schemeClr val="dk1"/>
@@ -18820,69 +18827,9 @@
                 <a:cs typeface="Aharoni"/>
                 <a:sym typeface="Aharoni"/>
               </a:rPr>
-              <a:t> de </a:t>
+              <a:t>Topic Analysis - Results</a:t>
             </a:r>
-            <a:r>
-              <a:rPr lang="en-US" sz="2800" dirty="0" err="1">
-                <a:solidFill>
-                  <a:schemeClr val="dk1"/>
-                </a:solidFill>
-                <a:latin typeface="Aharoni"/>
-                <a:ea typeface="Aharoni"/>
-                <a:cs typeface="Aharoni"/>
-                <a:sym typeface="Aharoni"/>
-              </a:rPr>
-              <a:t>Tópicos</a:t>
-            </a:r>
-            <a:r>
-              <a:rPr lang="en-US" sz="2800" dirty="0">
-                <a:solidFill>
-                  <a:schemeClr val="dk1"/>
-                </a:solidFill>
-                <a:latin typeface="Aharoni"/>
-                <a:ea typeface="Aharoni"/>
-                <a:cs typeface="Aharoni"/>
-                <a:sym typeface="Aharoni"/>
-              </a:rPr>
-              <a:t> - </a:t>
-            </a:r>
-            <a:r>
-              <a:rPr lang="en-US" sz="2800" dirty="0" err="1">
-                <a:solidFill>
-                  <a:schemeClr val="dk1"/>
-                </a:solidFill>
-                <a:latin typeface="Aharoni"/>
-                <a:ea typeface="Aharoni"/>
-                <a:cs typeface="Aharoni"/>
-                <a:sym typeface="Aharoni"/>
-              </a:rPr>
-              <a:t>Resultados</a:t>
-            </a:r>
-            <a:r>
-              <a:rPr lang="en-US" sz="2800" dirty="0">
-                <a:solidFill>
-                  <a:schemeClr val="dk1"/>
-                </a:solidFill>
-                <a:latin typeface="Aharoni"/>
-                <a:ea typeface="Aharoni"/>
-                <a:cs typeface="Aharoni"/>
-                <a:sym typeface="Aharoni"/>
-              </a:rPr>
-              <a:t> </a:t>
-            </a:r>
-            <a:r>
-              <a:rPr lang="en-US" sz="2800" dirty="0" err="1">
-                <a:solidFill>
-                  <a:schemeClr val="dk1"/>
-                </a:solidFill>
-                <a:latin typeface="Aharoni"/>
-                <a:ea typeface="Aharoni"/>
-                <a:cs typeface="Aharoni"/>
-                <a:sym typeface="Aharoni"/>
-              </a:rPr>
-              <a:t>Obtenidos</a:t>
-            </a:r>
-            <a:endParaRPr dirty="0"/>
+            <a:endParaRPr lang="en-US" sz="2800" dirty="0"/>
           </a:p>
           <a:p>
             <a:pPr marL="0" marR="0" lvl="0" indent="0" algn="l" rtl="0">
@@ -18895,7 +18842,7 @@
               <a:buNone/>
             </a:pPr>
             <a:r>
-              <a:rPr lang="en-US" sz="2400" b="1" i="1" dirty="0" err="1">
+              <a:rPr lang="en-US" sz="2400" b="1" i="1" dirty="0">
                 <a:solidFill>
                   <a:srgbClr val="00B0F0"/>
                 </a:solidFill>
@@ -18904,7 +18851,7 @@
                 <a:cs typeface="Aharoni"/>
                 <a:sym typeface="Aharoni"/>
               </a:rPr>
-              <a:t>Promotores</a:t>
+              <a:t>Promoters</a:t>
             </a:r>
             <a:endParaRPr sz="2400" b="1" i="1" dirty="0">
               <a:solidFill>

</xml_diff>